<commit_message>
Actualizacion de ppt  ...V7
</commit_message>
<xml_diff>
--- a/Presentacion/0 PPT Presentación/PPT Desastres Naturales, Impacto H y E, Estructura v7.pptx
+++ b/Presentacion/0 PPT Presentación/PPT Desastres Naturales, Impacto H y E, Estructura v7.pptx
@@ -5,20 +5,21 @@
     <p:sldMasterId id="2147483648" r:id="rId1"/>
   </p:sldMasterIdLst>
   <p:sldIdLst>
-    <p:sldId id="256" r:id="rId2"/>
-    <p:sldId id="264" r:id="rId3"/>
-    <p:sldId id="257" r:id="rId4"/>
-    <p:sldId id="260" r:id="rId5"/>
-    <p:sldId id="258" r:id="rId6"/>
-    <p:sldId id="273" r:id="rId7"/>
-    <p:sldId id="259" r:id="rId8"/>
-    <p:sldId id="271" r:id="rId9"/>
+    <p:sldId id="264" r:id="rId2"/>
+    <p:sldId id="274" r:id="rId3"/>
+    <p:sldId id="256" r:id="rId4"/>
+    <p:sldId id="257" r:id="rId5"/>
+    <p:sldId id="260" r:id="rId6"/>
+    <p:sldId id="258" r:id="rId7"/>
+    <p:sldId id="273" r:id="rId8"/>
+    <p:sldId id="259" r:id="rId9"/>
     <p:sldId id="266" r:id="rId10"/>
     <p:sldId id="267" r:id="rId11"/>
     <p:sldId id="268" r:id="rId12"/>
     <p:sldId id="262" r:id="rId13"/>
     <p:sldId id="265" r:id="rId14"/>
-    <p:sldId id="269" r:id="rId15"/>
+    <p:sldId id="275" r:id="rId15"/>
+    <p:sldId id="269" r:id="rId16"/>
   </p:sldIdLst>
   <p:sldSz cx="12192000" cy="6858000"/>
   <p:notesSz cx="7010400" cy="9296400"/>
@@ -134,6 +135,71 @@
     </p:ext>
   </p:extLst>
 </p:presentation>
+</file>
+
+<file path=ppt/changesInfos/changesInfo1.xml><?xml version="1.0" encoding="utf-8"?>
+<pc:chgInfo xmlns:a="http://schemas.openxmlformats.org/drawingml/2006/main" xmlns:r="http://schemas.openxmlformats.org/officeDocument/2006/relationships" xmlns:ac="http://schemas.microsoft.com/office/drawing/2013/main/command" xmlns:pc="http://schemas.microsoft.com/office/powerpoint/2013/main/command">
+  <pc:docChgLst>
+    <pc:chgData name="Rafael De Marco Z" userId="c9003632114417e9" providerId="LiveId" clId="{8A5B3F72-8301-44A4-8B48-5238DABC24EE}"/>
+    <pc:docChg chg="undo custSel addSld delSld modSld sldOrd">
+      <pc:chgData name="Rafael De Marco Z" userId="c9003632114417e9" providerId="LiveId" clId="{8A5B3F72-8301-44A4-8B48-5238DABC24EE}" dt="2023-07-25T15:22:20.672" v="133" actId="20577"/>
+      <pc:docMkLst>
+        <pc:docMk/>
+      </pc:docMkLst>
+      <pc:sldChg chg="ord">
+        <pc:chgData name="Rafael De Marco Z" userId="c9003632114417e9" providerId="LiveId" clId="{8A5B3F72-8301-44A4-8B48-5238DABC24EE}" dt="2023-07-25T14:54:44.385" v="1"/>
+        <pc:sldMkLst>
+          <pc:docMk/>
+          <pc:sldMk cId="3015927900" sldId="264"/>
+        </pc:sldMkLst>
+      </pc:sldChg>
+      <pc:sldChg chg="modSp mod">
+        <pc:chgData name="Rafael De Marco Z" userId="c9003632114417e9" providerId="LiveId" clId="{8A5B3F72-8301-44A4-8B48-5238DABC24EE}" dt="2023-07-25T15:22:20.672" v="133" actId="20577"/>
+        <pc:sldMkLst>
+          <pc:docMk/>
+          <pc:sldMk cId="808093744" sldId="265"/>
+        </pc:sldMkLst>
+        <pc:spChg chg="mod">
+          <ac:chgData name="Rafael De Marco Z" userId="c9003632114417e9" providerId="LiveId" clId="{8A5B3F72-8301-44A4-8B48-5238DABC24EE}" dt="2023-07-25T15:22:20.672" v="133" actId="20577"/>
+          <ac:spMkLst>
+            <pc:docMk/>
+            <pc:sldMk cId="808093744" sldId="265"/>
+            <ac:spMk id="2" creationId="{A6E6A715-74AF-E1C4-60AE-6007F1860474}"/>
+          </ac:spMkLst>
+        </pc:spChg>
+      </pc:sldChg>
+      <pc:sldChg chg="del">
+        <pc:chgData name="Rafael De Marco Z" userId="c9003632114417e9" providerId="LiveId" clId="{8A5B3F72-8301-44A4-8B48-5238DABC24EE}" dt="2023-07-25T15:03:45.800" v="62" actId="2696"/>
+        <pc:sldMkLst>
+          <pc:docMk/>
+          <pc:sldMk cId="4053829698" sldId="271"/>
+        </pc:sldMkLst>
+      </pc:sldChg>
+      <pc:sldChg chg="addSp delSp modSp add mod">
+        <pc:chgData name="Rafael De Marco Z" userId="c9003632114417e9" providerId="LiveId" clId="{8A5B3F72-8301-44A4-8B48-5238DABC24EE}" dt="2023-07-25T14:56:54.971" v="61" actId="1076"/>
+        <pc:sldMkLst>
+          <pc:docMk/>
+          <pc:sldMk cId="4043605050" sldId="274"/>
+        </pc:sldMkLst>
+        <pc:spChg chg="add del mod">
+          <ac:chgData name="Rafael De Marco Z" userId="c9003632114417e9" providerId="LiveId" clId="{8A5B3F72-8301-44A4-8B48-5238DABC24EE}" dt="2023-07-25T14:56:54.971" v="61" actId="1076"/>
+          <ac:spMkLst>
+            <pc:docMk/>
+            <pc:sldMk cId="4043605050" sldId="274"/>
+            <ac:spMk id="2" creationId="{8D5E7077-8415-C0D4-8A86-8D2497796B5A}"/>
+          </ac:spMkLst>
+        </pc:spChg>
+      </pc:sldChg>
+      <pc:sldChg chg="add">
+        <pc:chgData name="Rafael De Marco Z" userId="c9003632114417e9" providerId="LiveId" clId="{8A5B3F72-8301-44A4-8B48-5238DABC24EE}" dt="2023-07-25T15:21:25.385" v="63" actId="2890"/>
+        <pc:sldMkLst>
+          <pc:docMk/>
+          <pc:sldMk cId="3697392574" sldId="275"/>
+        </pc:sldMkLst>
+      </pc:sldChg>
+    </pc:docChg>
+  </pc:docChgLst>
+</pc:chgInfo>
 </file>
 
 <file path=ppt/slideLayouts/slideLayout1.xml><?xml version="1.0" encoding="utf-8"?>
@@ -3366,230 +3432,12 @@
           <a:chExt cx="0" cy="0"/>
         </a:xfrm>
       </p:grpSpPr>
-      <p:pic>
-        <p:nvPicPr>
-          <p:cNvPr id="8" name="Imagen 7" descr="Imagen que contiene piedra, ladrillo, tabla, pieza&#10;&#10;Descripción generada automáticamente">
-            <a:extLst>
-              <a:ext uri="{FF2B5EF4-FFF2-40B4-BE49-F238E27FC236}">
-                <a16:creationId xmlns:a16="http://schemas.microsoft.com/office/drawing/2014/main" id="{638F1D77-0AD8-4342-FB39-A49B1E118241}"/>
-              </a:ext>
-            </a:extLst>
-          </p:cNvPr>
-          <p:cNvPicPr>
-            <a:picLocks noChangeAspect="1"/>
-          </p:cNvPicPr>
-          <p:nvPr/>
-        </p:nvPicPr>
-        <p:blipFill>
-          <a:blip r:embed="rId2">
-            <a:extLst>
-              <a:ext uri="{28A0092B-C50C-407E-A947-70E740481C1C}">
-                <a14:useLocalDpi xmlns:a14="http://schemas.microsoft.com/office/drawing/2010/main" val="0"/>
-              </a:ext>
-            </a:extLst>
-          </a:blip>
-          <a:stretch>
-            <a:fillRect/>
-          </a:stretch>
-        </p:blipFill>
-        <p:spPr>
-          <a:xfrm>
-            <a:off x="2990403" y="842756"/>
-            <a:ext cx="3240000" cy="2160000"/>
-          </a:xfrm>
-          <a:prstGeom prst="rect">
-            <a:avLst/>
-          </a:prstGeom>
-        </p:spPr>
-      </p:pic>
-      <p:pic>
-        <p:nvPicPr>
-          <p:cNvPr id="12" name="Imagen 11" descr="Una carretera a la orilla de la calle&#10;&#10;Descripción generada automáticamente">
-            <a:extLst>
-              <a:ext uri="{FF2B5EF4-FFF2-40B4-BE49-F238E27FC236}">
-                <a16:creationId xmlns:a16="http://schemas.microsoft.com/office/drawing/2014/main" id="{1D71812A-D2C4-6D6A-3AC9-140AEBF550A0}"/>
-              </a:ext>
-            </a:extLst>
-          </p:cNvPr>
-          <p:cNvPicPr>
-            <a:picLocks noChangeAspect="1"/>
-          </p:cNvPicPr>
-          <p:nvPr/>
-        </p:nvPicPr>
-        <p:blipFill>
-          <a:blip r:embed="rId3">
-            <a:extLst>
-              <a:ext uri="{28A0092B-C50C-407E-A947-70E740481C1C}">
-                <a14:useLocalDpi xmlns:a14="http://schemas.microsoft.com/office/drawing/2010/main" val="0"/>
-              </a:ext>
-            </a:extLst>
-          </a:blip>
-          <a:stretch>
-            <a:fillRect/>
-          </a:stretch>
-        </p:blipFill>
-        <p:spPr>
-          <a:xfrm>
-            <a:off x="2496000" y="2975662"/>
-            <a:ext cx="3243186" cy="2160000"/>
-          </a:xfrm>
-          <a:prstGeom prst="rect">
-            <a:avLst/>
-          </a:prstGeom>
-        </p:spPr>
-      </p:pic>
-      <p:pic>
-        <p:nvPicPr>
-          <p:cNvPr id="10" name="Imagen 9" descr="Diagrama&#10;&#10;Descripción generada automáticamente">
-            <a:extLst>
-              <a:ext uri="{FF2B5EF4-FFF2-40B4-BE49-F238E27FC236}">
-                <a16:creationId xmlns:a16="http://schemas.microsoft.com/office/drawing/2014/main" id="{421C6A7D-005B-71F5-356A-F8C97C481E42}"/>
-              </a:ext>
-            </a:extLst>
-          </p:cNvPr>
-          <p:cNvPicPr>
-            <a:picLocks noChangeAspect="1"/>
-          </p:cNvPicPr>
-          <p:nvPr/>
-        </p:nvPicPr>
-        <p:blipFill>
-          <a:blip r:embed="rId4">
-            <a:alphaModFix/>
-            <a:extLst>
-              <a:ext uri="{28A0092B-C50C-407E-A947-70E740481C1C}">
-                <a14:useLocalDpi xmlns:a14="http://schemas.microsoft.com/office/drawing/2010/main" val="0"/>
-              </a:ext>
-            </a:extLst>
-          </a:blip>
-          <a:stretch>
-            <a:fillRect/>
-          </a:stretch>
-        </p:blipFill>
-        <p:spPr>
-          <a:xfrm>
-            <a:off x="346718" y="2520452"/>
-            <a:ext cx="3194403" cy="2176187"/>
-          </a:xfrm>
-          <a:prstGeom prst="rect">
-            <a:avLst/>
-          </a:prstGeom>
-        </p:spPr>
-      </p:pic>
-      <p:pic>
-        <p:nvPicPr>
-          <p:cNvPr id="6" name="Imagen 5" descr="Un puente sobre un rio&#10;&#10;Descripción generada automáticamente con confianza media">
-            <a:extLst>
-              <a:ext uri="{FF2B5EF4-FFF2-40B4-BE49-F238E27FC236}">
-                <a16:creationId xmlns:a16="http://schemas.microsoft.com/office/drawing/2014/main" id="{02731800-262C-6CCE-EB15-B5FD494C1963}"/>
-              </a:ext>
-            </a:extLst>
-          </p:cNvPr>
-          <p:cNvPicPr>
-            <a:picLocks noChangeAspect="1"/>
-          </p:cNvPicPr>
-          <p:nvPr/>
-        </p:nvPicPr>
-        <p:blipFill>
-          <a:blip r:embed="rId5">
-            <a:extLst>
-              <a:ext uri="{28A0092B-C50C-407E-A947-70E740481C1C}">
-                <a14:useLocalDpi xmlns:a14="http://schemas.microsoft.com/office/drawing/2010/main" val="0"/>
-              </a:ext>
-            </a:extLst>
-          </a:blip>
-          <a:stretch>
-            <a:fillRect/>
-          </a:stretch>
-        </p:blipFill>
-        <p:spPr>
-          <a:xfrm>
-            <a:off x="696000" y="417985"/>
-            <a:ext cx="3240000" cy="2160000"/>
-          </a:xfrm>
-          <a:prstGeom prst="rect">
-            <a:avLst/>
-          </a:prstGeom>
-        </p:spPr>
-      </p:pic>
-      <p:pic>
-        <p:nvPicPr>
-          <p:cNvPr id="14" name="Imagen 13" descr="Una imagen de un videojuego&#10;&#10;Descripción generada automáticamente con confianza baja">
-            <a:extLst>
-              <a:ext uri="{FF2B5EF4-FFF2-40B4-BE49-F238E27FC236}">
-                <a16:creationId xmlns:a16="http://schemas.microsoft.com/office/drawing/2014/main" id="{C1DD5F70-70B6-F4F4-CEA1-C86982A7544D}"/>
-              </a:ext>
-            </a:extLst>
-          </p:cNvPr>
-          <p:cNvPicPr>
-            <a:picLocks noChangeAspect="1"/>
-          </p:cNvPicPr>
-          <p:nvPr/>
-        </p:nvPicPr>
-        <p:blipFill>
-          <a:blip r:embed="rId6">
-            <a:extLst>
-              <a:ext uri="{28A0092B-C50C-407E-A947-70E740481C1C}">
-                <a14:useLocalDpi xmlns:a14="http://schemas.microsoft.com/office/drawing/2010/main" val="0"/>
-              </a:ext>
-            </a:extLst>
-          </a:blip>
-          <a:stretch>
-            <a:fillRect/>
-          </a:stretch>
-        </p:blipFill>
-        <p:spPr>
-          <a:xfrm>
-            <a:off x="1157737" y="4646076"/>
-            <a:ext cx="2676525" cy="1704975"/>
-          </a:xfrm>
-          <a:prstGeom prst="rect">
-            <a:avLst/>
-          </a:prstGeom>
-        </p:spPr>
-      </p:pic>
-      <p:pic>
-        <p:nvPicPr>
-          <p:cNvPr id="16" name="Imagen 15" descr="Imagen en blanco y negro&#10;&#10;Descripción generada automáticamente con confianza baja">
-            <a:extLst>
-              <a:ext uri="{FF2B5EF4-FFF2-40B4-BE49-F238E27FC236}">
-                <a16:creationId xmlns:a16="http://schemas.microsoft.com/office/drawing/2014/main" id="{A9225ABD-7EAD-D1F5-2268-527EE55E5A66}"/>
-              </a:ext>
-            </a:extLst>
-          </p:cNvPr>
-          <p:cNvPicPr>
-            <a:picLocks noChangeAspect="1"/>
-          </p:cNvPicPr>
-          <p:nvPr/>
-        </p:nvPicPr>
-        <p:blipFill>
-          <a:blip r:embed="rId7">
-            <a:alphaModFix amt="75000"/>
-            <a:extLst>
-              <a:ext uri="{28A0092B-C50C-407E-A947-70E740481C1C}">
-                <a14:useLocalDpi xmlns:a14="http://schemas.microsoft.com/office/drawing/2010/main" val="0"/>
-              </a:ext>
-            </a:extLst>
-          </a:blip>
-          <a:stretch>
-            <a:fillRect/>
-          </a:stretch>
-        </p:blipFill>
-        <p:spPr>
-          <a:xfrm>
-            <a:off x="5879470" y="395274"/>
-            <a:ext cx="5991557" cy="5589000"/>
-          </a:xfrm>
-          <a:prstGeom prst="rect">
-            <a:avLst/>
-          </a:prstGeom>
-        </p:spPr>
-      </p:pic>
-      <p:sp>
-        <p:nvSpPr>
-          <p:cNvPr id="18" name="CuadroTexto 17">
-            <a:extLst>
-              <a:ext uri="{FF2B5EF4-FFF2-40B4-BE49-F238E27FC236}">
-                <a16:creationId xmlns:a16="http://schemas.microsoft.com/office/drawing/2014/main" id="{A03EF617-4EA0-2EC5-B883-6746ACFA356B}"/>
+      <p:sp>
+        <p:nvSpPr>
+          <p:cNvPr id="2" name="CuadroTexto 1">
+            <a:extLst>
+              <a:ext uri="{FF2B5EF4-FFF2-40B4-BE49-F238E27FC236}">
+                <a16:creationId xmlns:a16="http://schemas.microsoft.com/office/drawing/2014/main" id="{8D5E7077-8415-C0D4-8A86-8D2497796B5A}"/>
               </a:ext>
             </a:extLst>
           </p:cNvPr>
@@ -3598,8 +3446,8 @@
         </p:nvSpPr>
         <p:spPr>
           <a:xfrm>
-            <a:off x="6491892" y="709820"/>
-            <a:ext cx="5353390" cy="3990836"/>
+            <a:off x="1056000" y="549000"/>
+            <a:ext cx="5760000" cy="923330"/>
           </a:xfrm>
           <a:prstGeom prst="rect">
             <a:avLst/>
@@ -3607,155 +3455,36 @@
           <a:noFill/>
         </p:spPr>
         <p:txBody>
-          <a:bodyPr wrap="square">
-            <a:spAutoFit/>
-          </a:bodyPr>
-          <a:lstStyle/>
-          <a:p>
-            <a:pPr algn="just">
-              <a:spcAft>
-                <a:spcPts val="800"/>
-              </a:spcAft>
-            </a:pPr>
-            <a:r>
-              <a:rPr lang="es-VE" sz="1200" i="1" kern="100" dirty="0">
-                <a:latin typeface="Calibri" panose="020F0502020204030204" pitchFamily="34" charset="0"/>
-                <a:ea typeface="Calibri" panose="020F0502020204030204" pitchFamily="34" charset="0"/>
-                <a:cs typeface="Times New Roman" panose="02020603050405020304" pitchFamily="18" charset="0"/>
-              </a:rPr>
-              <a:t>Guion (duración estimada en ensayos, 15 segundos)</a:t>
-            </a:r>
-          </a:p>
-          <a:p>
-            <a:pPr algn="just">
-              <a:spcAft>
-                <a:spcPts val="800"/>
-              </a:spcAft>
-            </a:pPr>
-            <a:r>
-              <a:rPr lang="es-VE" sz="1600" kern="100" dirty="0">
-                <a:effectLst/>
-                <a:latin typeface="Calibri" panose="020F0502020204030204" pitchFamily="34" charset="0"/>
-                <a:ea typeface="Calibri" panose="020F0502020204030204" pitchFamily="34" charset="0"/>
-                <a:cs typeface="Times New Roman" panose="02020603050405020304" pitchFamily="18" charset="0"/>
-              </a:rPr>
-              <a:t>Movimientos de agua, aire, tierra y fuego, fenómenos naturales que han modelado a la Tierra desde sus inicios, responsables , quizás, del nacimiento de la vida en nuestro Planeta. Nos cautivan y embelesan con su despliegue de sonidos, luces y colores. Nos aterran, cuando la fuerza de sus movimientos producen cuantiosas pérdidas de vidas, daños ambientales y materiales, hablamos entonces de Desastres Naturales.</a:t>
-            </a:r>
-          </a:p>
-          <a:p>
-            <a:pPr algn="just">
-              <a:spcAft>
-                <a:spcPts val="800"/>
-              </a:spcAft>
-            </a:pPr>
-            <a:r>
-              <a:rPr lang="es-VE" sz="1600" kern="100" dirty="0">
-                <a:effectLst/>
-                <a:latin typeface="Calibri" panose="020F0502020204030204" pitchFamily="34" charset="0"/>
-                <a:ea typeface="Calibri" panose="020F0502020204030204" pitchFamily="34" charset="0"/>
-                <a:cs typeface="Times New Roman" panose="02020603050405020304" pitchFamily="18" charset="0"/>
-              </a:rPr>
-              <a:t>Conscientes de las potencialidades de la Ciencia de los Datos, cabe preguntarse: ¿ Podrán técnicas como el Big Data, el Machine </a:t>
-            </a:r>
-            <a:r>
-              <a:rPr lang="es-VE" sz="1600" kern="100" dirty="0" err="1">
-                <a:effectLst/>
-                <a:latin typeface="Calibri" panose="020F0502020204030204" pitchFamily="34" charset="0"/>
-                <a:ea typeface="Calibri" panose="020F0502020204030204" pitchFamily="34" charset="0"/>
-                <a:cs typeface="Times New Roman" panose="02020603050405020304" pitchFamily="18" charset="0"/>
-              </a:rPr>
-              <a:t>Learning</a:t>
-            </a:r>
-            <a:r>
-              <a:rPr lang="es-VE" sz="1600" kern="100" dirty="0">
-                <a:effectLst/>
-                <a:latin typeface="Calibri" panose="020F0502020204030204" pitchFamily="34" charset="0"/>
-                <a:ea typeface="Calibri" panose="020F0502020204030204" pitchFamily="34" charset="0"/>
-                <a:cs typeface="Times New Roman" panose="02020603050405020304" pitchFamily="18" charset="0"/>
-              </a:rPr>
-              <a:t> y la Inteligencia Artificial,  ayudarnos a prever y planificar respuestas ante esos desastres naturales, que nos ayuden a mitigar sus impactos en nuestro Planeta Tierra</a:t>
-            </a:r>
-          </a:p>
-        </p:txBody>
-      </p:sp>
-      <p:sp>
-        <p:nvSpPr>
-          <p:cNvPr id="19" name="CuadroTexto 18">
-            <a:extLst>
-              <a:ext uri="{FF2B5EF4-FFF2-40B4-BE49-F238E27FC236}">
-                <a16:creationId xmlns:a16="http://schemas.microsoft.com/office/drawing/2014/main" id="{BEF98FFF-2A3B-67B6-626F-35B35CF38C25}"/>
-              </a:ext>
-            </a:extLst>
-          </p:cNvPr>
-          <p:cNvSpPr txBox="1"/>
-          <p:nvPr/>
-        </p:nvSpPr>
-        <p:spPr>
-          <a:xfrm>
-            <a:off x="6755624" y="4952460"/>
-            <a:ext cx="5122498" cy="1138773"/>
-          </a:xfrm>
-          <a:prstGeom prst="rect">
-            <a:avLst/>
-          </a:prstGeom>
-          <a:noFill/>
-        </p:spPr>
-        <p:txBody>
           <a:bodyPr wrap="square" rtlCol="0">
             <a:spAutoFit/>
           </a:bodyPr>
           <a:lstStyle/>
           <a:p>
-            <a:pPr algn="r"/>
-            <a:r>
-              <a:rPr lang="es-VE" sz="4000" b="1" i="1" dirty="0"/>
-              <a:t>Desastres Naturales</a:t>
-            </a:r>
-          </a:p>
-          <a:p>
-            <a:pPr algn="r"/>
-            <a:r>
-              <a:rPr lang="es-VE" sz="2800" i="1" dirty="0"/>
-              <a:t>Impacto Humano y Económico</a:t>
-            </a:r>
-            <a:endParaRPr lang="es-ES" sz="2800" i="1" dirty="0"/>
-          </a:p>
-        </p:txBody>
-      </p:sp>
-      <p:pic>
-        <p:nvPicPr>
-          <p:cNvPr id="3" name="Imagen 2">
-            <a:extLst>
-              <a:ext uri="{FF2B5EF4-FFF2-40B4-BE49-F238E27FC236}">
-                <a16:creationId xmlns:a16="http://schemas.microsoft.com/office/drawing/2014/main" id="{CBFE5CA5-7357-41C2-8048-C2CE68F42F52}"/>
-              </a:ext>
-            </a:extLst>
-          </p:cNvPr>
-          <p:cNvPicPr>
-            <a:picLocks noChangeAspect="1"/>
-          </p:cNvPicPr>
-          <p:nvPr/>
-        </p:nvPicPr>
-        <p:blipFill>
-          <a:blip r:embed="rId8"/>
-          <a:stretch>
-            <a:fillRect/>
-          </a:stretch>
-        </p:blipFill>
-        <p:spPr>
-          <a:xfrm>
-            <a:off x="3834262" y="5142833"/>
-            <a:ext cx="2866916" cy="1377086"/>
-          </a:xfrm>
-          <a:prstGeom prst="rect">
-            <a:avLst/>
-          </a:prstGeom>
-        </p:spPr>
-      </p:pic>
+            <a:r>
+              <a:rPr lang="es-VE" dirty="0"/>
+              <a:t>Equipo</a:t>
+            </a:r>
+          </a:p>
+          <a:p>
+            <a:endParaRPr lang="es-VE" dirty="0"/>
+          </a:p>
+          <a:p>
+            <a:r>
+              <a:rPr lang="es-VE" dirty="0"/>
+              <a:t>Incluir perfiles </a:t>
+            </a:r>
+            <a:r>
+              <a:rPr lang="es-VE" dirty="0" err="1"/>
+              <a:t>Linkedin</a:t>
+            </a:r>
+            <a:endParaRPr lang="es-ES" dirty="0"/>
+          </a:p>
+        </p:txBody>
+      </p:sp>
     </p:spTree>
     <p:extLst>
       <p:ext uri="{BB962C8B-B14F-4D97-AF65-F5344CB8AC3E}">
-        <p14:creationId xmlns:p14="http://schemas.microsoft.com/office/powerpoint/2010/main" val="2884550432"/>
+        <p14:creationId xmlns:p14="http://schemas.microsoft.com/office/powerpoint/2010/main" val="3015927900"/>
       </p:ext>
     </p:extLst>
   </p:cSld>
@@ -4475,7 +4204,7 @@
           <a:p>
             <a:r>
               <a:rPr lang="es-VE" dirty="0"/>
-              <a:t>Conclusiones y recomendaciones, desarrollos futuros</a:t>
+              <a:t>Modelo de Negocio</a:t>
             </a:r>
             <a:endParaRPr lang="es-ES" dirty="0"/>
           </a:p>
@@ -4516,6 +4245,72 @@
           <p:cNvPr id="2" name="CuadroTexto 1">
             <a:extLst>
               <a:ext uri="{FF2B5EF4-FFF2-40B4-BE49-F238E27FC236}">
+                <a16:creationId xmlns:a16="http://schemas.microsoft.com/office/drawing/2014/main" id="{A6E6A715-74AF-E1C4-60AE-6007F1860474}"/>
+              </a:ext>
+            </a:extLst>
+          </p:cNvPr>
+          <p:cNvSpPr txBox="1"/>
+          <p:nvPr/>
+        </p:nvSpPr>
+        <p:spPr>
+          <a:xfrm>
+            <a:off x="1056000" y="549000"/>
+            <a:ext cx="7560000" cy="369332"/>
+          </a:xfrm>
+          <a:prstGeom prst="rect">
+            <a:avLst/>
+          </a:prstGeom>
+          <a:noFill/>
+        </p:spPr>
+        <p:txBody>
+          <a:bodyPr wrap="square" rtlCol="0">
+            <a:spAutoFit/>
+          </a:bodyPr>
+          <a:lstStyle/>
+          <a:p>
+            <a:r>
+              <a:rPr lang="es-VE" dirty="0"/>
+              <a:t>Conclusiones y recomendaciones, desarrollos futuros</a:t>
+            </a:r>
+            <a:endParaRPr lang="es-ES" dirty="0"/>
+          </a:p>
+        </p:txBody>
+      </p:sp>
+    </p:spTree>
+    <p:extLst>
+      <p:ext uri="{BB962C8B-B14F-4D97-AF65-F5344CB8AC3E}">
+        <p14:creationId xmlns:p14="http://schemas.microsoft.com/office/powerpoint/2010/main" val="3697392574"/>
+      </p:ext>
+    </p:extLst>
+  </p:cSld>
+  <p:clrMapOvr>
+    <a:masterClrMapping/>
+  </p:clrMapOvr>
+</p:sld>
+</file>
+
+<file path=ppt/slides/slide15.xml><?xml version="1.0" encoding="utf-8"?>
+<p:sld xmlns:a="http://schemas.openxmlformats.org/drawingml/2006/main" xmlns:r="http://schemas.openxmlformats.org/officeDocument/2006/relationships" xmlns:p="http://schemas.openxmlformats.org/presentationml/2006/main">
+  <p:cSld>
+    <p:spTree>
+      <p:nvGrpSpPr>
+        <p:cNvPr id="1" name=""/>
+        <p:cNvGrpSpPr/>
+        <p:nvPr/>
+      </p:nvGrpSpPr>
+      <p:grpSpPr>
+        <a:xfrm>
+          <a:off x="0" y="0"/>
+          <a:ext cx="0" cy="0"/>
+          <a:chOff x="0" y="0"/>
+          <a:chExt cx="0" cy="0"/>
+        </a:xfrm>
+      </p:grpSpPr>
+      <p:sp>
+        <p:nvSpPr>
+          <p:cNvPr id="2" name="CuadroTexto 1">
+            <a:extLst>
+              <a:ext uri="{FF2B5EF4-FFF2-40B4-BE49-F238E27FC236}">
                 <a16:creationId xmlns:a16="http://schemas.microsoft.com/office/drawing/2014/main" id="{4FC71EF0-C83A-9D64-9A63-8E39A519BB27}"/>
               </a:ext>
             </a:extLst>
@@ -4591,8 +4386,8 @@
         </p:nvSpPr>
         <p:spPr>
           <a:xfrm>
-            <a:off x="1056000" y="549000"/>
-            <a:ext cx="5760000" cy="923330"/>
+            <a:off x="3576000" y="3069000"/>
+            <a:ext cx="5760000" cy="369332"/>
           </a:xfrm>
           <a:prstGeom prst="rect">
             <a:avLst/>
@@ -4607,29 +4402,20 @@
           <a:p>
             <a:r>
               <a:rPr lang="es-VE" dirty="0"/>
-              <a:t>Equipo</a:t>
-            </a:r>
-          </a:p>
-          <a:p>
+              <a:t>Video de </a:t>
+            </a:r>
+            <a:r>
+              <a:rPr lang="es-VE" dirty="0" err="1"/>
+              <a:t>introduccion</a:t>
+            </a:r>
             <a:endParaRPr lang="es-VE" dirty="0"/>
-          </a:p>
-          <a:p>
-            <a:r>
-              <a:rPr lang="es-VE" dirty="0"/>
-              <a:t>Incluir perfiles </a:t>
-            </a:r>
-            <a:r>
-              <a:rPr lang="es-VE" dirty="0" err="1"/>
-              <a:t>Linkedin</a:t>
-            </a:r>
-            <a:endParaRPr lang="es-ES" dirty="0"/>
           </a:p>
         </p:txBody>
       </p:sp>
     </p:spTree>
     <p:extLst>
       <p:ext uri="{BB962C8B-B14F-4D97-AF65-F5344CB8AC3E}">
-        <p14:creationId xmlns:p14="http://schemas.microsoft.com/office/powerpoint/2010/main" val="3015927900"/>
+        <p14:creationId xmlns:p14="http://schemas.microsoft.com/office/powerpoint/2010/main" val="4043605050"/>
       </p:ext>
     </p:extLst>
   </p:cSld>
@@ -4656,12 +4442,230 @@
           <a:chExt cx="0" cy="0"/>
         </a:xfrm>
       </p:grpSpPr>
-      <p:sp>
-        <p:nvSpPr>
-          <p:cNvPr id="5" name="CuadroTexto 4">
-            <a:extLst>
-              <a:ext uri="{FF2B5EF4-FFF2-40B4-BE49-F238E27FC236}">
-                <a16:creationId xmlns:a16="http://schemas.microsoft.com/office/drawing/2014/main" id="{9587CD09-0DA5-3C60-C664-AAF954300DB4}"/>
+      <p:pic>
+        <p:nvPicPr>
+          <p:cNvPr id="8" name="Imagen 7" descr="Imagen que contiene piedra, ladrillo, tabla, pieza&#10;&#10;Descripción generada automáticamente">
+            <a:extLst>
+              <a:ext uri="{FF2B5EF4-FFF2-40B4-BE49-F238E27FC236}">
+                <a16:creationId xmlns:a16="http://schemas.microsoft.com/office/drawing/2014/main" id="{638F1D77-0AD8-4342-FB39-A49B1E118241}"/>
+              </a:ext>
+            </a:extLst>
+          </p:cNvPr>
+          <p:cNvPicPr>
+            <a:picLocks noChangeAspect="1"/>
+          </p:cNvPicPr>
+          <p:nvPr/>
+        </p:nvPicPr>
+        <p:blipFill>
+          <a:blip r:embed="rId2">
+            <a:extLst>
+              <a:ext uri="{28A0092B-C50C-407E-A947-70E740481C1C}">
+                <a14:useLocalDpi xmlns:a14="http://schemas.microsoft.com/office/drawing/2010/main" val="0"/>
+              </a:ext>
+            </a:extLst>
+          </a:blip>
+          <a:stretch>
+            <a:fillRect/>
+          </a:stretch>
+        </p:blipFill>
+        <p:spPr>
+          <a:xfrm>
+            <a:off x="2990403" y="842756"/>
+            <a:ext cx="3240000" cy="2160000"/>
+          </a:xfrm>
+          <a:prstGeom prst="rect">
+            <a:avLst/>
+          </a:prstGeom>
+        </p:spPr>
+      </p:pic>
+      <p:pic>
+        <p:nvPicPr>
+          <p:cNvPr id="12" name="Imagen 11" descr="Una carretera a la orilla de la calle&#10;&#10;Descripción generada automáticamente">
+            <a:extLst>
+              <a:ext uri="{FF2B5EF4-FFF2-40B4-BE49-F238E27FC236}">
+                <a16:creationId xmlns:a16="http://schemas.microsoft.com/office/drawing/2014/main" id="{1D71812A-D2C4-6D6A-3AC9-140AEBF550A0}"/>
+              </a:ext>
+            </a:extLst>
+          </p:cNvPr>
+          <p:cNvPicPr>
+            <a:picLocks noChangeAspect="1"/>
+          </p:cNvPicPr>
+          <p:nvPr/>
+        </p:nvPicPr>
+        <p:blipFill>
+          <a:blip r:embed="rId3">
+            <a:extLst>
+              <a:ext uri="{28A0092B-C50C-407E-A947-70E740481C1C}">
+                <a14:useLocalDpi xmlns:a14="http://schemas.microsoft.com/office/drawing/2010/main" val="0"/>
+              </a:ext>
+            </a:extLst>
+          </a:blip>
+          <a:stretch>
+            <a:fillRect/>
+          </a:stretch>
+        </p:blipFill>
+        <p:spPr>
+          <a:xfrm>
+            <a:off x="2496000" y="2975662"/>
+            <a:ext cx="3243186" cy="2160000"/>
+          </a:xfrm>
+          <a:prstGeom prst="rect">
+            <a:avLst/>
+          </a:prstGeom>
+        </p:spPr>
+      </p:pic>
+      <p:pic>
+        <p:nvPicPr>
+          <p:cNvPr id="10" name="Imagen 9" descr="Diagrama&#10;&#10;Descripción generada automáticamente">
+            <a:extLst>
+              <a:ext uri="{FF2B5EF4-FFF2-40B4-BE49-F238E27FC236}">
+                <a16:creationId xmlns:a16="http://schemas.microsoft.com/office/drawing/2014/main" id="{421C6A7D-005B-71F5-356A-F8C97C481E42}"/>
+              </a:ext>
+            </a:extLst>
+          </p:cNvPr>
+          <p:cNvPicPr>
+            <a:picLocks noChangeAspect="1"/>
+          </p:cNvPicPr>
+          <p:nvPr/>
+        </p:nvPicPr>
+        <p:blipFill>
+          <a:blip r:embed="rId4">
+            <a:alphaModFix/>
+            <a:extLst>
+              <a:ext uri="{28A0092B-C50C-407E-A947-70E740481C1C}">
+                <a14:useLocalDpi xmlns:a14="http://schemas.microsoft.com/office/drawing/2010/main" val="0"/>
+              </a:ext>
+            </a:extLst>
+          </a:blip>
+          <a:stretch>
+            <a:fillRect/>
+          </a:stretch>
+        </p:blipFill>
+        <p:spPr>
+          <a:xfrm>
+            <a:off x="346718" y="2520452"/>
+            <a:ext cx="3194403" cy="2176187"/>
+          </a:xfrm>
+          <a:prstGeom prst="rect">
+            <a:avLst/>
+          </a:prstGeom>
+        </p:spPr>
+      </p:pic>
+      <p:pic>
+        <p:nvPicPr>
+          <p:cNvPr id="6" name="Imagen 5" descr="Un puente sobre un rio&#10;&#10;Descripción generada automáticamente con confianza media">
+            <a:extLst>
+              <a:ext uri="{FF2B5EF4-FFF2-40B4-BE49-F238E27FC236}">
+                <a16:creationId xmlns:a16="http://schemas.microsoft.com/office/drawing/2014/main" id="{02731800-262C-6CCE-EB15-B5FD494C1963}"/>
+              </a:ext>
+            </a:extLst>
+          </p:cNvPr>
+          <p:cNvPicPr>
+            <a:picLocks noChangeAspect="1"/>
+          </p:cNvPicPr>
+          <p:nvPr/>
+        </p:nvPicPr>
+        <p:blipFill>
+          <a:blip r:embed="rId5">
+            <a:extLst>
+              <a:ext uri="{28A0092B-C50C-407E-A947-70E740481C1C}">
+                <a14:useLocalDpi xmlns:a14="http://schemas.microsoft.com/office/drawing/2010/main" val="0"/>
+              </a:ext>
+            </a:extLst>
+          </a:blip>
+          <a:stretch>
+            <a:fillRect/>
+          </a:stretch>
+        </p:blipFill>
+        <p:spPr>
+          <a:xfrm>
+            <a:off x="696000" y="417985"/>
+            <a:ext cx="3240000" cy="2160000"/>
+          </a:xfrm>
+          <a:prstGeom prst="rect">
+            <a:avLst/>
+          </a:prstGeom>
+        </p:spPr>
+      </p:pic>
+      <p:pic>
+        <p:nvPicPr>
+          <p:cNvPr id="14" name="Imagen 13" descr="Una imagen de un videojuego&#10;&#10;Descripción generada automáticamente con confianza baja">
+            <a:extLst>
+              <a:ext uri="{FF2B5EF4-FFF2-40B4-BE49-F238E27FC236}">
+                <a16:creationId xmlns:a16="http://schemas.microsoft.com/office/drawing/2014/main" id="{C1DD5F70-70B6-F4F4-CEA1-C86982A7544D}"/>
+              </a:ext>
+            </a:extLst>
+          </p:cNvPr>
+          <p:cNvPicPr>
+            <a:picLocks noChangeAspect="1"/>
+          </p:cNvPicPr>
+          <p:nvPr/>
+        </p:nvPicPr>
+        <p:blipFill>
+          <a:blip r:embed="rId6">
+            <a:extLst>
+              <a:ext uri="{28A0092B-C50C-407E-A947-70E740481C1C}">
+                <a14:useLocalDpi xmlns:a14="http://schemas.microsoft.com/office/drawing/2010/main" val="0"/>
+              </a:ext>
+            </a:extLst>
+          </a:blip>
+          <a:stretch>
+            <a:fillRect/>
+          </a:stretch>
+        </p:blipFill>
+        <p:spPr>
+          <a:xfrm>
+            <a:off x="1157737" y="4646076"/>
+            <a:ext cx="2676525" cy="1704975"/>
+          </a:xfrm>
+          <a:prstGeom prst="rect">
+            <a:avLst/>
+          </a:prstGeom>
+        </p:spPr>
+      </p:pic>
+      <p:pic>
+        <p:nvPicPr>
+          <p:cNvPr id="16" name="Imagen 15" descr="Imagen en blanco y negro&#10;&#10;Descripción generada automáticamente con confianza baja">
+            <a:extLst>
+              <a:ext uri="{FF2B5EF4-FFF2-40B4-BE49-F238E27FC236}">
+                <a16:creationId xmlns:a16="http://schemas.microsoft.com/office/drawing/2014/main" id="{A9225ABD-7EAD-D1F5-2268-527EE55E5A66}"/>
+              </a:ext>
+            </a:extLst>
+          </p:cNvPr>
+          <p:cNvPicPr>
+            <a:picLocks noChangeAspect="1"/>
+          </p:cNvPicPr>
+          <p:nvPr/>
+        </p:nvPicPr>
+        <p:blipFill>
+          <a:blip r:embed="rId7">
+            <a:alphaModFix amt="75000"/>
+            <a:extLst>
+              <a:ext uri="{28A0092B-C50C-407E-A947-70E740481C1C}">
+                <a14:useLocalDpi xmlns:a14="http://schemas.microsoft.com/office/drawing/2010/main" val="0"/>
+              </a:ext>
+            </a:extLst>
+          </a:blip>
+          <a:stretch>
+            <a:fillRect/>
+          </a:stretch>
+        </p:blipFill>
+        <p:spPr>
+          <a:xfrm>
+            <a:off x="5879470" y="395274"/>
+            <a:ext cx="5991557" cy="5589000"/>
+          </a:xfrm>
+          <a:prstGeom prst="rect">
+            <a:avLst/>
+          </a:prstGeom>
+        </p:spPr>
+      </p:pic>
+      <p:sp>
+        <p:nvSpPr>
+          <p:cNvPr id="18" name="CuadroTexto 17">
+            <a:extLst>
+              <a:ext uri="{FF2B5EF4-FFF2-40B4-BE49-F238E27FC236}">
+                <a16:creationId xmlns:a16="http://schemas.microsoft.com/office/drawing/2014/main" id="{A03EF617-4EA0-2EC5-B883-6746ACFA356B}"/>
               </a:ext>
             </a:extLst>
           </p:cNvPr>
@@ -4670,8 +4674,8 @@
         </p:nvSpPr>
         <p:spPr>
           <a:xfrm>
-            <a:off x="1776000" y="909000"/>
-            <a:ext cx="9360000" cy="5632311"/>
+            <a:off x="6491892" y="709820"/>
+            <a:ext cx="5353390" cy="3990836"/>
           </a:xfrm>
           <a:prstGeom prst="rect">
             <a:avLst/>
@@ -4684,91 +4688,150 @@
           </a:bodyPr>
           <a:lstStyle/>
           <a:p>
-            <a:r>
-              <a:rPr lang="es-ES" dirty="0"/>
-              <a:t>Objetivos</a:t>
-            </a:r>
-          </a:p>
-          <a:p>
-            <a:endParaRPr lang="es-ES" dirty="0"/>
-          </a:p>
-          <a:p>
-            <a:r>
-              <a:rPr lang="es-ES" dirty="0"/>
-              <a:t>Descubrir la riqueza de información de un </a:t>
-            </a:r>
-            <a:r>
-              <a:rPr lang="es-ES" dirty="0" err="1"/>
-              <a:t>dataset</a:t>
-            </a:r>
-            <a:r>
-              <a:rPr lang="es-ES" dirty="0"/>
-              <a:t> aplicando las diferentes herramientas vistas en el curso.</a:t>
-            </a:r>
-          </a:p>
-          <a:p>
-            <a:endParaRPr lang="es-ES" dirty="0"/>
-          </a:p>
-          <a:p>
-            <a:r>
-              <a:rPr lang="es-ES" dirty="0"/>
-              <a:t>Conocer la magnitud de los diferentes desastres naturales.</a:t>
-            </a:r>
-          </a:p>
-          <a:p>
-            <a:endParaRPr lang="es-ES" dirty="0"/>
-          </a:p>
-          <a:p>
-            <a:r>
-              <a:rPr lang="es-ES" dirty="0"/>
-              <a:t>Comprender  su impacto humano y económico.</a:t>
-            </a:r>
-          </a:p>
-          <a:p>
-            <a:endParaRPr lang="es-ES" dirty="0"/>
-          </a:p>
-          <a:p>
-            <a:pPr algn="just"/>
-            <a:r>
-              <a:rPr lang="es-ES" dirty="0"/>
-              <a:t>Preparar un primer esbozo de modelo(s) predictivo de alguno(s) de los desastres naturales con los que se pudiere anticipar su probable ocurrencia. </a:t>
-            </a:r>
-          </a:p>
-          <a:p>
-            <a:pPr algn="just"/>
-            <a:endParaRPr lang="es-ES" dirty="0"/>
-          </a:p>
-          <a:p>
-            <a:pPr algn="just"/>
-            <a:r>
-              <a:rPr lang="es-ES" dirty="0"/>
-              <a:t>Despertar el interés en el desarrollo de este tipo de herramientas, con la cuales en un futuro se pueda generar información que sea útil a quienes les competa las tareas de planificar respuestas antes esos fenómenos naturales y  minimizar el impacto de los mismos. Aplicando los recursos y técnicas que hoy día nos proporcionan  disciplinas tales como Análisis de datos, Big Data, Machine </a:t>
-            </a:r>
-            <a:r>
-              <a:rPr lang="es-ES" dirty="0" err="1"/>
+            <a:pPr algn="just">
+              <a:spcAft>
+                <a:spcPts val="800"/>
+              </a:spcAft>
+            </a:pPr>
+            <a:r>
+              <a:rPr lang="es-VE" sz="1200" i="1" kern="100" dirty="0">
+                <a:latin typeface="Calibri" panose="020F0502020204030204" pitchFamily="34" charset="0"/>
+                <a:ea typeface="Calibri" panose="020F0502020204030204" pitchFamily="34" charset="0"/>
+                <a:cs typeface="Times New Roman" panose="02020603050405020304" pitchFamily="18" charset="0"/>
+              </a:rPr>
+              <a:t>Guion (duración estimada en ensayos, 15 segundos)</a:t>
+            </a:r>
+          </a:p>
+          <a:p>
+            <a:pPr algn="just">
+              <a:spcAft>
+                <a:spcPts val="800"/>
+              </a:spcAft>
+            </a:pPr>
+            <a:r>
+              <a:rPr lang="es-VE" sz="1600" kern="100" dirty="0">
+                <a:effectLst/>
+                <a:latin typeface="Calibri" panose="020F0502020204030204" pitchFamily="34" charset="0"/>
+                <a:ea typeface="Calibri" panose="020F0502020204030204" pitchFamily="34" charset="0"/>
+                <a:cs typeface="Times New Roman" panose="02020603050405020304" pitchFamily="18" charset="0"/>
+              </a:rPr>
+              <a:t>Movimientos de agua, aire, tierra y fuego, fenómenos naturales que han modelado a la Tierra desde sus inicios, responsables , quizás, del nacimiento de la vida en nuestro Planeta. Nos cautivan y embelesan con su despliegue de sonidos, luces y colores. Nos aterran, cuando la fuerza de sus movimientos producen cuantiosas pérdidas de vidas, daños ambientales y materiales, hablamos entonces de Desastres Naturales.</a:t>
+            </a:r>
+          </a:p>
+          <a:p>
+            <a:pPr algn="just">
+              <a:spcAft>
+                <a:spcPts val="800"/>
+              </a:spcAft>
+            </a:pPr>
+            <a:r>
+              <a:rPr lang="es-VE" sz="1600" kern="100" dirty="0">
+                <a:effectLst/>
+                <a:latin typeface="Calibri" panose="020F0502020204030204" pitchFamily="34" charset="0"/>
+                <a:ea typeface="Calibri" panose="020F0502020204030204" pitchFamily="34" charset="0"/>
+                <a:cs typeface="Times New Roman" panose="02020603050405020304" pitchFamily="18" charset="0"/>
+              </a:rPr>
+              <a:t>Conscientes de las potencialidades de la Ciencia de los Datos, cabe preguntarse: ¿ Podrán técnicas como el Big Data, el Machine </a:t>
+            </a:r>
+            <a:r>
+              <a:rPr lang="es-VE" sz="1600" kern="100" dirty="0" err="1">
+                <a:effectLst/>
+                <a:latin typeface="Calibri" panose="020F0502020204030204" pitchFamily="34" charset="0"/>
+                <a:ea typeface="Calibri" panose="020F0502020204030204" pitchFamily="34" charset="0"/>
+                <a:cs typeface="Times New Roman" panose="02020603050405020304" pitchFamily="18" charset="0"/>
+              </a:rPr>
               <a:t>Learning</a:t>
             </a:r>
             <a:r>
-              <a:rPr lang="es-ES" dirty="0"/>
-              <a:t> e Inteligencia Artificial.</a:t>
-            </a:r>
-          </a:p>
-          <a:p>
-            <a:pPr algn="just"/>
-            <a:endParaRPr lang="es-ES" dirty="0"/>
-          </a:p>
-          <a:p>
-            <a:endParaRPr lang="es-ES" dirty="0"/>
-          </a:p>
-          <a:p>
-            <a:endParaRPr lang="es-ES" dirty="0"/>
-          </a:p>
-        </p:txBody>
-      </p:sp>
+              <a:rPr lang="es-VE" sz="1600" kern="100" dirty="0">
+                <a:effectLst/>
+                <a:latin typeface="Calibri" panose="020F0502020204030204" pitchFamily="34" charset="0"/>
+                <a:ea typeface="Calibri" panose="020F0502020204030204" pitchFamily="34" charset="0"/>
+                <a:cs typeface="Times New Roman" panose="02020603050405020304" pitchFamily="18" charset="0"/>
+              </a:rPr>
+              <a:t> y la Inteligencia Artificial,  ayudarnos a prever y planificar respuestas ante esos desastres naturales, que nos ayuden a mitigar sus impactos en nuestro Planeta Tierra</a:t>
+            </a:r>
+          </a:p>
+        </p:txBody>
+      </p:sp>
+      <p:sp>
+        <p:nvSpPr>
+          <p:cNvPr id="19" name="CuadroTexto 18">
+            <a:extLst>
+              <a:ext uri="{FF2B5EF4-FFF2-40B4-BE49-F238E27FC236}">
+                <a16:creationId xmlns:a16="http://schemas.microsoft.com/office/drawing/2014/main" id="{BEF98FFF-2A3B-67B6-626F-35B35CF38C25}"/>
+              </a:ext>
+            </a:extLst>
+          </p:cNvPr>
+          <p:cNvSpPr txBox="1"/>
+          <p:nvPr/>
+        </p:nvSpPr>
+        <p:spPr>
+          <a:xfrm>
+            <a:off x="6755624" y="4952460"/>
+            <a:ext cx="5122498" cy="1138773"/>
+          </a:xfrm>
+          <a:prstGeom prst="rect">
+            <a:avLst/>
+          </a:prstGeom>
+          <a:noFill/>
+        </p:spPr>
+        <p:txBody>
+          <a:bodyPr wrap="square" rtlCol="0">
+            <a:spAutoFit/>
+          </a:bodyPr>
+          <a:lstStyle/>
+          <a:p>
+            <a:pPr algn="r"/>
+            <a:r>
+              <a:rPr lang="es-VE" sz="4000" b="1" i="1" dirty="0"/>
+              <a:t>Desastres Naturales</a:t>
+            </a:r>
+          </a:p>
+          <a:p>
+            <a:pPr algn="r"/>
+            <a:r>
+              <a:rPr lang="es-VE" sz="2800" i="1" dirty="0"/>
+              <a:t>Impacto Humano y Económico</a:t>
+            </a:r>
+            <a:endParaRPr lang="es-ES" sz="2800" i="1" dirty="0"/>
+          </a:p>
+        </p:txBody>
+      </p:sp>
+      <p:pic>
+        <p:nvPicPr>
+          <p:cNvPr id="3" name="Imagen 2">
+            <a:extLst>
+              <a:ext uri="{FF2B5EF4-FFF2-40B4-BE49-F238E27FC236}">
+                <a16:creationId xmlns:a16="http://schemas.microsoft.com/office/drawing/2014/main" id="{CBFE5CA5-7357-41C2-8048-C2CE68F42F52}"/>
+              </a:ext>
+            </a:extLst>
+          </p:cNvPr>
+          <p:cNvPicPr>
+            <a:picLocks noChangeAspect="1"/>
+          </p:cNvPicPr>
+          <p:nvPr/>
+        </p:nvPicPr>
+        <p:blipFill>
+          <a:blip r:embed="rId8"/>
+          <a:stretch>
+            <a:fillRect/>
+          </a:stretch>
+        </p:blipFill>
+        <p:spPr>
+          <a:xfrm>
+            <a:off x="3834262" y="5142833"/>
+            <a:ext cx="2866916" cy="1377086"/>
+          </a:xfrm>
+          <a:prstGeom prst="rect">
+            <a:avLst/>
+          </a:prstGeom>
+        </p:spPr>
+      </p:pic>
     </p:spTree>
     <p:extLst>
       <p:ext uri="{BB962C8B-B14F-4D97-AF65-F5344CB8AC3E}">
-        <p14:creationId xmlns:p14="http://schemas.microsoft.com/office/powerpoint/2010/main" val="3721405878"/>
+        <p14:creationId xmlns:p14="http://schemas.microsoft.com/office/powerpoint/2010/main" val="2884550432"/>
       </p:ext>
     </p:extLst>
   </p:cSld>
@@ -4797,6 +4860,145 @@
       </p:grpSpPr>
       <p:sp>
         <p:nvSpPr>
+          <p:cNvPr id="5" name="CuadroTexto 4">
+            <a:extLst>
+              <a:ext uri="{FF2B5EF4-FFF2-40B4-BE49-F238E27FC236}">
+                <a16:creationId xmlns:a16="http://schemas.microsoft.com/office/drawing/2014/main" id="{9587CD09-0DA5-3C60-C664-AAF954300DB4}"/>
+              </a:ext>
+            </a:extLst>
+          </p:cNvPr>
+          <p:cNvSpPr txBox="1"/>
+          <p:nvPr/>
+        </p:nvSpPr>
+        <p:spPr>
+          <a:xfrm>
+            <a:off x="1776000" y="909000"/>
+            <a:ext cx="9360000" cy="5632311"/>
+          </a:xfrm>
+          <a:prstGeom prst="rect">
+            <a:avLst/>
+          </a:prstGeom>
+          <a:noFill/>
+        </p:spPr>
+        <p:txBody>
+          <a:bodyPr wrap="square">
+            <a:spAutoFit/>
+          </a:bodyPr>
+          <a:lstStyle/>
+          <a:p>
+            <a:r>
+              <a:rPr lang="es-ES" dirty="0"/>
+              <a:t>Objetivos</a:t>
+            </a:r>
+          </a:p>
+          <a:p>
+            <a:endParaRPr lang="es-ES" dirty="0"/>
+          </a:p>
+          <a:p>
+            <a:r>
+              <a:rPr lang="es-ES" dirty="0"/>
+              <a:t>Descubrir la riqueza de información de un </a:t>
+            </a:r>
+            <a:r>
+              <a:rPr lang="es-ES" dirty="0" err="1"/>
+              <a:t>dataset</a:t>
+            </a:r>
+            <a:r>
+              <a:rPr lang="es-ES" dirty="0"/>
+              <a:t> aplicando las diferentes herramientas vistas en el curso.</a:t>
+            </a:r>
+          </a:p>
+          <a:p>
+            <a:endParaRPr lang="es-ES" dirty="0"/>
+          </a:p>
+          <a:p>
+            <a:r>
+              <a:rPr lang="es-ES" dirty="0"/>
+              <a:t>Conocer la magnitud de los diferentes desastres naturales.</a:t>
+            </a:r>
+          </a:p>
+          <a:p>
+            <a:endParaRPr lang="es-ES" dirty="0"/>
+          </a:p>
+          <a:p>
+            <a:r>
+              <a:rPr lang="es-ES" dirty="0"/>
+              <a:t>Comprender  su impacto humano y económico.</a:t>
+            </a:r>
+          </a:p>
+          <a:p>
+            <a:endParaRPr lang="es-ES" dirty="0"/>
+          </a:p>
+          <a:p>
+            <a:pPr algn="just"/>
+            <a:r>
+              <a:rPr lang="es-ES" dirty="0"/>
+              <a:t>Preparar un primer esbozo de modelo(s) predictivo de alguno(s) de los desastres naturales con los que se pudiere anticipar su probable ocurrencia. </a:t>
+            </a:r>
+          </a:p>
+          <a:p>
+            <a:pPr algn="just"/>
+            <a:endParaRPr lang="es-ES" dirty="0"/>
+          </a:p>
+          <a:p>
+            <a:pPr algn="just"/>
+            <a:r>
+              <a:rPr lang="es-ES" dirty="0"/>
+              <a:t>Despertar el interés en el desarrollo de este tipo de herramientas, con la cuales en un futuro se pueda generar información que sea útil a quienes les competa las tareas de planificar respuestas antes esos fenómenos naturales y  minimizar el impacto de los mismos. Aplicando los recursos y técnicas que hoy día nos proporcionan  disciplinas tales como Análisis de datos, Big Data, Machine </a:t>
+            </a:r>
+            <a:r>
+              <a:rPr lang="es-ES" dirty="0" err="1"/>
+              <a:t>Learning</a:t>
+            </a:r>
+            <a:r>
+              <a:rPr lang="es-ES" dirty="0"/>
+              <a:t> e Inteligencia Artificial.</a:t>
+            </a:r>
+          </a:p>
+          <a:p>
+            <a:pPr algn="just"/>
+            <a:endParaRPr lang="es-ES" dirty="0"/>
+          </a:p>
+          <a:p>
+            <a:endParaRPr lang="es-ES" dirty="0"/>
+          </a:p>
+          <a:p>
+            <a:endParaRPr lang="es-ES" dirty="0"/>
+          </a:p>
+        </p:txBody>
+      </p:sp>
+    </p:spTree>
+    <p:extLst>
+      <p:ext uri="{BB962C8B-B14F-4D97-AF65-F5344CB8AC3E}">
+        <p14:creationId xmlns:p14="http://schemas.microsoft.com/office/powerpoint/2010/main" val="3721405878"/>
+      </p:ext>
+    </p:extLst>
+  </p:cSld>
+  <p:clrMapOvr>
+    <a:masterClrMapping/>
+  </p:clrMapOvr>
+</p:sld>
+</file>
+
+<file path=ppt/slides/slide5.xml><?xml version="1.0" encoding="utf-8"?>
+<p:sld xmlns:a="http://schemas.openxmlformats.org/drawingml/2006/main" xmlns:r="http://schemas.openxmlformats.org/officeDocument/2006/relationships" xmlns:p="http://schemas.openxmlformats.org/presentationml/2006/main">
+  <p:cSld>
+    <p:spTree>
+      <p:nvGrpSpPr>
+        <p:cNvPr id="1" name=""/>
+        <p:cNvGrpSpPr/>
+        <p:nvPr/>
+      </p:nvGrpSpPr>
+      <p:grpSpPr>
+        <a:xfrm>
+          <a:off x="0" y="0"/>
+          <a:ext cx="0" cy="0"/>
+          <a:chOff x="0" y="0"/>
+          <a:chExt cx="0" cy="0"/>
+        </a:xfrm>
+      </p:grpSpPr>
+      <p:sp>
+        <p:nvSpPr>
           <p:cNvPr id="4" name="CuadroTexto 3">
             <a:extLst>
               <a:ext uri="{FF2B5EF4-FFF2-40B4-BE49-F238E27FC236}">
@@ -4874,7 +5076,7 @@
 </p:sld>
 </file>
 
-<file path=ppt/slides/slide5.xml><?xml version="1.0" encoding="utf-8"?>
+<file path=ppt/slides/slide6.xml><?xml version="1.0" encoding="utf-8"?>
 <p:sld xmlns:a="http://schemas.openxmlformats.org/drawingml/2006/main" xmlns:r="http://schemas.openxmlformats.org/officeDocument/2006/relationships" xmlns:p="http://schemas.openxmlformats.org/presentationml/2006/main">
   <p:cSld>
     <p:spTree>
@@ -6319,1406 +6521,6 @@
 </p:sld>
 </file>
 
-<file path=ppt/slides/slide6.xml><?xml version="1.0" encoding="utf-8"?>
-<p:sld xmlns:a="http://schemas.openxmlformats.org/drawingml/2006/main" xmlns:r="http://schemas.openxmlformats.org/officeDocument/2006/relationships" xmlns:p="http://schemas.openxmlformats.org/presentationml/2006/main">
-  <p:cSld>
-    <p:spTree>
-      <p:nvGrpSpPr>
-        <p:cNvPr id="1" name=""/>
-        <p:cNvGrpSpPr/>
-        <p:nvPr/>
-      </p:nvGrpSpPr>
-      <p:grpSpPr>
-        <a:xfrm>
-          <a:off x="0" y="0"/>
-          <a:ext cx="0" cy="0"/>
-          <a:chOff x="0" y="0"/>
-          <a:chExt cx="0" cy="0"/>
-        </a:xfrm>
-      </p:grpSpPr>
-      <p:sp>
-        <p:nvSpPr>
-          <p:cNvPr id="4" name="CuadroTexto 3">
-            <a:extLst>
-              <a:ext uri="{FF2B5EF4-FFF2-40B4-BE49-F238E27FC236}">
-                <a16:creationId xmlns:a16="http://schemas.microsoft.com/office/drawing/2014/main" id="{BE3FAE17-F51D-057F-6684-A6075E80CF95}"/>
-              </a:ext>
-            </a:extLst>
-          </p:cNvPr>
-          <p:cNvSpPr txBox="1"/>
-          <p:nvPr/>
-        </p:nvSpPr>
-        <p:spPr>
-          <a:xfrm>
-            <a:off x="336000" y="221161"/>
-            <a:ext cx="1440000" cy="461665"/>
-          </a:xfrm>
-          <a:prstGeom prst="rect">
-            <a:avLst/>
-          </a:prstGeom>
-          <a:noFill/>
-        </p:spPr>
-        <p:txBody>
-          <a:bodyPr wrap="square" rtlCol="0">
-            <a:spAutoFit/>
-          </a:bodyPr>
-          <a:lstStyle/>
-          <a:p>
-            <a:r>
-              <a:rPr lang="es-VE" sz="2400" b="1" dirty="0"/>
-              <a:t>Proceso</a:t>
-            </a:r>
-            <a:endParaRPr lang="es-ES" sz="2400" b="1" dirty="0"/>
-          </a:p>
-        </p:txBody>
-      </p:sp>
-      <p:sp>
-        <p:nvSpPr>
-          <p:cNvPr id="37" name="CuadroTexto 36">
-            <a:extLst>
-              <a:ext uri="{FF2B5EF4-FFF2-40B4-BE49-F238E27FC236}">
-                <a16:creationId xmlns:a16="http://schemas.microsoft.com/office/drawing/2014/main" id="{E03CC5C9-BF20-B42E-CB28-440A255F4277}"/>
-              </a:ext>
-            </a:extLst>
-          </p:cNvPr>
-          <p:cNvSpPr txBox="1"/>
-          <p:nvPr/>
-        </p:nvSpPr>
-        <p:spPr>
-          <a:xfrm>
-            <a:off x="5837718" y="2059871"/>
-            <a:ext cx="1380834" cy="369332"/>
-          </a:xfrm>
-          <a:prstGeom prst="rect">
-            <a:avLst/>
-          </a:prstGeom>
-          <a:noFill/>
-        </p:spPr>
-        <p:txBody>
-          <a:bodyPr wrap="square" rtlCol="0">
-            <a:spAutoFit/>
-          </a:bodyPr>
-          <a:lstStyle/>
-          <a:p>
-            <a:r>
-              <a:rPr lang="es-VE" b="1" dirty="0"/>
-              <a:t>Aplicaciones</a:t>
-            </a:r>
-            <a:endParaRPr lang="es-ES" b="1" dirty="0"/>
-          </a:p>
-        </p:txBody>
-      </p:sp>
-      <p:sp>
-        <p:nvSpPr>
-          <p:cNvPr id="48" name="Rectángulo 47">
-            <a:extLst>
-              <a:ext uri="{FF2B5EF4-FFF2-40B4-BE49-F238E27FC236}">
-                <a16:creationId xmlns:a16="http://schemas.microsoft.com/office/drawing/2014/main" id="{8EADD379-A001-CDC6-33A9-655A8C64A230}"/>
-              </a:ext>
-            </a:extLst>
-          </p:cNvPr>
-          <p:cNvSpPr/>
-          <p:nvPr/>
-        </p:nvSpPr>
-        <p:spPr>
-          <a:xfrm>
-            <a:off x="1432186" y="4922261"/>
-            <a:ext cx="4649166" cy="1551681"/>
-          </a:xfrm>
-          <a:prstGeom prst="rect">
-            <a:avLst/>
-          </a:prstGeom>
-          <a:solidFill>
-            <a:srgbClr val="ECF5E7">
-              <a:alpha val="70000"/>
-            </a:srgbClr>
-          </a:solidFill>
-          <a:ln>
-            <a:noFill/>
-          </a:ln>
-        </p:spPr>
-        <p:style>
-          <a:lnRef idx="2">
-            <a:schemeClr val="accent1">
-              <a:shade val="15000"/>
-            </a:schemeClr>
-          </a:lnRef>
-          <a:fillRef idx="1">
-            <a:schemeClr val="accent1"/>
-          </a:fillRef>
-          <a:effectRef idx="0">
-            <a:schemeClr val="accent1"/>
-          </a:effectRef>
-          <a:fontRef idx="minor">
-            <a:schemeClr val="lt1"/>
-          </a:fontRef>
-        </p:style>
-        <p:txBody>
-          <a:bodyPr rtlCol="0" anchor="ctr"/>
-          <a:lstStyle/>
-          <a:p>
-            <a:pPr algn="ctr"/>
-            <a:endParaRPr lang="es-ES"/>
-          </a:p>
-        </p:txBody>
-      </p:sp>
-      <p:sp>
-        <p:nvSpPr>
-          <p:cNvPr id="46" name="Rectángulo 45">
-            <a:extLst>
-              <a:ext uri="{FF2B5EF4-FFF2-40B4-BE49-F238E27FC236}">
-                <a16:creationId xmlns:a16="http://schemas.microsoft.com/office/drawing/2014/main" id="{10AC415C-D855-1B76-5AC8-4E80324D902D}"/>
-              </a:ext>
-            </a:extLst>
-          </p:cNvPr>
-          <p:cNvSpPr/>
-          <p:nvPr/>
-        </p:nvSpPr>
-        <p:spPr>
-          <a:xfrm>
-            <a:off x="7019001" y="4915107"/>
-            <a:ext cx="4634506" cy="1551681"/>
-          </a:xfrm>
-          <a:prstGeom prst="rect">
-            <a:avLst/>
-          </a:prstGeom>
-          <a:solidFill>
-            <a:srgbClr val="ECF5E7">
-              <a:alpha val="70000"/>
-            </a:srgbClr>
-          </a:solidFill>
-          <a:ln>
-            <a:noFill/>
-          </a:ln>
-        </p:spPr>
-        <p:style>
-          <a:lnRef idx="2">
-            <a:schemeClr val="accent1">
-              <a:shade val="15000"/>
-            </a:schemeClr>
-          </a:lnRef>
-          <a:fillRef idx="1">
-            <a:schemeClr val="accent1"/>
-          </a:fillRef>
-          <a:effectRef idx="0">
-            <a:schemeClr val="accent1"/>
-          </a:effectRef>
-          <a:fontRef idx="minor">
-            <a:schemeClr val="lt1"/>
-          </a:fontRef>
-        </p:style>
-        <p:txBody>
-          <a:bodyPr rtlCol="0" anchor="ctr"/>
-          <a:lstStyle/>
-          <a:p>
-            <a:pPr algn="ctr"/>
-            <a:endParaRPr lang="es-ES"/>
-          </a:p>
-        </p:txBody>
-      </p:sp>
-      <p:sp>
-        <p:nvSpPr>
-          <p:cNvPr id="45" name="Rectángulo 44">
-            <a:extLst>
-              <a:ext uri="{FF2B5EF4-FFF2-40B4-BE49-F238E27FC236}">
-                <a16:creationId xmlns:a16="http://schemas.microsoft.com/office/drawing/2014/main" id="{219D33C0-8D5E-6F67-24FB-BD4B4F6BCF37}"/>
-              </a:ext>
-            </a:extLst>
-          </p:cNvPr>
-          <p:cNvSpPr/>
-          <p:nvPr/>
-        </p:nvSpPr>
-        <p:spPr>
-          <a:xfrm>
-            <a:off x="7059917" y="2615753"/>
-            <a:ext cx="4634506" cy="1524421"/>
-          </a:xfrm>
-          <a:prstGeom prst="rect">
-            <a:avLst/>
-          </a:prstGeom>
-          <a:solidFill>
-            <a:srgbClr val="ECF5E7">
-              <a:alpha val="70000"/>
-            </a:srgbClr>
-          </a:solidFill>
-          <a:ln>
-            <a:noFill/>
-          </a:ln>
-        </p:spPr>
-        <p:style>
-          <a:lnRef idx="2">
-            <a:schemeClr val="accent1">
-              <a:shade val="15000"/>
-            </a:schemeClr>
-          </a:lnRef>
-          <a:fillRef idx="1">
-            <a:schemeClr val="accent1"/>
-          </a:fillRef>
-          <a:effectRef idx="0">
-            <a:schemeClr val="accent1"/>
-          </a:effectRef>
-          <a:fontRef idx="minor">
-            <a:schemeClr val="lt1"/>
-          </a:fontRef>
-        </p:style>
-        <p:txBody>
-          <a:bodyPr rtlCol="0" anchor="ctr"/>
-          <a:lstStyle/>
-          <a:p>
-            <a:pPr algn="ctr"/>
-            <a:endParaRPr lang="es-ES"/>
-          </a:p>
-        </p:txBody>
-      </p:sp>
-      <p:sp>
-        <p:nvSpPr>
-          <p:cNvPr id="44" name="Rectángulo 43">
-            <a:extLst>
-              <a:ext uri="{FF2B5EF4-FFF2-40B4-BE49-F238E27FC236}">
-                <a16:creationId xmlns:a16="http://schemas.microsoft.com/office/drawing/2014/main" id="{C0E2984C-D213-9278-C029-D0505BA17E60}"/>
-              </a:ext>
-            </a:extLst>
-          </p:cNvPr>
-          <p:cNvSpPr/>
-          <p:nvPr/>
-        </p:nvSpPr>
-        <p:spPr>
-          <a:xfrm>
-            <a:off x="1432186" y="2671199"/>
-            <a:ext cx="4668451" cy="1524421"/>
-          </a:xfrm>
-          <a:prstGeom prst="rect">
-            <a:avLst/>
-          </a:prstGeom>
-          <a:solidFill>
-            <a:srgbClr val="ECF5E7">
-              <a:alpha val="70000"/>
-            </a:srgbClr>
-          </a:solidFill>
-          <a:ln>
-            <a:noFill/>
-          </a:ln>
-        </p:spPr>
-        <p:style>
-          <a:lnRef idx="2">
-            <a:schemeClr val="accent1">
-              <a:shade val="15000"/>
-            </a:schemeClr>
-          </a:lnRef>
-          <a:fillRef idx="1">
-            <a:schemeClr val="accent1"/>
-          </a:fillRef>
-          <a:effectRef idx="0">
-            <a:schemeClr val="accent1"/>
-          </a:effectRef>
-          <a:fontRef idx="minor">
-            <a:schemeClr val="lt1"/>
-          </a:fontRef>
-        </p:style>
-        <p:txBody>
-          <a:bodyPr rtlCol="0" anchor="ctr"/>
-          <a:lstStyle/>
-          <a:p>
-            <a:pPr algn="ctr"/>
-            <a:endParaRPr lang="es-ES" dirty="0"/>
-          </a:p>
-        </p:txBody>
-      </p:sp>
-      <p:sp>
-        <p:nvSpPr>
-          <p:cNvPr id="43" name="Rectángulo 42">
-            <a:extLst>
-              <a:ext uri="{FF2B5EF4-FFF2-40B4-BE49-F238E27FC236}">
-                <a16:creationId xmlns:a16="http://schemas.microsoft.com/office/drawing/2014/main" id="{58F4C01C-A369-0BCA-72A6-E79514BB5A5B}"/>
-              </a:ext>
-            </a:extLst>
-          </p:cNvPr>
-          <p:cNvSpPr/>
-          <p:nvPr/>
-        </p:nvSpPr>
-        <p:spPr>
-          <a:xfrm>
-            <a:off x="1409382" y="800246"/>
-            <a:ext cx="10237507" cy="1067124"/>
-          </a:xfrm>
-          <a:prstGeom prst="rect">
-            <a:avLst/>
-          </a:prstGeom>
-          <a:solidFill>
-            <a:schemeClr val="accent5">
-              <a:lumMod val="20000"/>
-              <a:lumOff val="80000"/>
-              <a:alpha val="42000"/>
-            </a:schemeClr>
-          </a:solidFill>
-          <a:ln>
-            <a:noFill/>
-          </a:ln>
-          <a:effectLst/>
-        </p:spPr>
-        <p:style>
-          <a:lnRef idx="2">
-            <a:schemeClr val="accent1">
-              <a:shade val="15000"/>
-            </a:schemeClr>
-          </a:lnRef>
-          <a:fillRef idx="1">
-            <a:schemeClr val="accent1"/>
-          </a:fillRef>
-          <a:effectRef idx="0">
-            <a:schemeClr val="accent1"/>
-          </a:effectRef>
-          <a:fontRef idx="minor">
-            <a:schemeClr val="lt1"/>
-          </a:fontRef>
-        </p:style>
-        <p:txBody>
-          <a:bodyPr rtlCol="0" anchor="ctr"/>
-          <a:lstStyle/>
-          <a:p>
-            <a:pPr algn="ctr"/>
-            <a:endParaRPr lang="es-ES"/>
-          </a:p>
-        </p:txBody>
-      </p:sp>
-      <p:pic>
-        <p:nvPicPr>
-          <p:cNvPr id="22" name="Imagen 21">
-            <a:extLst>
-              <a:ext uri="{FF2B5EF4-FFF2-40B4-BE49-F238E27FC236}">
-                <a16:creationId xmlns:a16="http://schemas.microsoft.com/office/drawing/2014/main" id="{BEDEEC59-4731-4799-8457-9855AC6F8D4D}"/>
-              </a:ext>
-            </a:extLst>
-          </p:cNvPr>
-          <p:cNvPicPr>
-            <a:picLocks noChangeAspect="1"/>
-          </p:cNvPicPr>
-          <p:nvPr/>
-        </p:nvPicPr>
-        <p:blipFill>
-          <a:blip r:embed="rId2"/>
-          <a:stretch>
-            <a:fillRect/>
-          </a:stretch>
-        </p:blipFill>
-        <p:spPr>
-          <a:xfrm>
-            <a:off x="4028819" y="5151398"/>
-            <a:ext cx="1918646" cy="1000431"/>
-          </a:xfrm>
-          <a:prstGeom prst="rect">
-            <a:avLst/>
-          </a:prstGeom>
-        </p:spPr>
-      </p:pic>
-      <p:sp>
-        <p:nvSpPr>
-          <p:cNvPr id="16" name="CuadroTexto 15">
-            <a:extLst>
-              <a:ext uri="{FF2B5EF4-FFF2-40B4-BE49-F238E27FC236}">
-                <a16:creationId xmlns:a16="http://schemas.microsoft.com/office/drawing/2014/main" id="{7A532ED5-B280-9D2D-5C89-824A9A6A9527}"/>
-              </a:ext>
-            </a:extLst>
-          </p:cNvPr>
-          <p:cNvSpPr txBox="1"/>
-          <p:nvPr/>
-        </p:nvSpPr>
-        <p:spPr>
-          <a:xfrm>
-            <a:off x="4223911" y="6177252"/>
-            <a:ext cx="1517788" cy="307777"/>
-          </a:xfrm>
-          <a:prstGeom prst="rect">
-            <a:avLst/>
-          </a:prstGeom>
-          <a:noFill/>
-        </p:spPr>
-        <p:txBody>
-          <a:bodyPr wrap="square" rtlCol="0">
-            <a:spAutoFit/>
-          </a:bodyPr>
-          <a:lstStyle/>
-          <a:p>
-            <a:r>
-              <a:rPr lang="es-VE" sz="1400" dirty="0"/>
-              <a:t>Machine </a:t>
-            </a:r>
-            <a:r>
-              <a:rPr lang="es-VE" sz="1400" dirty="0" err="1"/>
-              <a:t>Learning</a:t>
-            </a:r>
-            <a:endParaRPr lang="es-ES" sz="1400" dirty="0"/>
-          </a:p>
-        </p:txBody>
-      </p:sp>
-      <p:pic>
-        <p:nvPicPr>
-          <p:cNvPr id="17" name="Imagen 16" descr="Logotipo, Icono&#10;&#10;Descripción generada automáticamente">
-            <a:extLst>
-              <a:ext uri="{FF2B5EF4-FFF2-40B4-BE49-F238E27FC236}">
-                <a16:creationId xmlns:a16="http://schemas.microsoft.com/office/drawing/2014/main" id="{C41AB976-8B35-17A3-DA91-D13506E46A37}"/>
-              </a:ext>
-            </a:extLst>
-          </p:cNvPr>
-          <p:cNvPicPr>
-            <a:picLocks noChangeAspect="1"/>
-          </p:cNvPicPr>
-          <p:nvPr/>
-        </p:nvPicPr>
-        <p:blipFill>
-          <a:blip r:embed="rId3">
-            <a:extLst>
-              <a:ext uri="{28A0092B-C50C-407E-A947-70E740481C1C}">
-                <a14:useLocalDpi xmlns:a14="http://schemas.microsoft.com/office/drawing/2010/main" val="0"/>
-              </a:ext>
-            </a:extLst>
-          </a:blip>
-          <a:stretch>
-            <a:fillRect/>
-          </a:stretch>
-        </p:blipFill>
-        <p:spPr>
-          <a:xfrm>
-            <a:off x="8674368" y="3076653"/>
-            <a:ext cx="683406" cy="688444"/>
-          </a:xfrm>
-          <a:prstGeom prst="rect">
-            <a:avLst/>
-          </a:prstGeom>
-        </p:spPr>
-      </p:pic>
-      <p:pic>
-        <p:nvPicPr>
-          <p:cNvPr id="19" name="Imagen 18">
-            <a:extLst>
-              <a:ext uri="{FF2B5EF4-FFF2-40B4-BE49-F238E27FC236}">
-                <a16:creationId xmlns:a16="http://schemas.microsoft.com/office/drawing/2014/main" id="{12125006-0A5F-03B0-E08B-CD9885B459A9}"/>
-              </a:ext>
-            </a:extLst>
-          </p:cNvPr>
-          <p:cNvPicPr>
-            <a:picLocks noChangeAspect="1"/>
-          </p:cNvPicPr>
-          <p:nvPr/>
-        </p:nvPicPr>
-        <p:blipFill>
-          <a:blip r:embed="rId4"/>
-          <a:stretch>
-            <a:fillRect/>
-          </a:stretch>
-        </p:blipFill>
-        <p:spPr>
-          <a:xfrm>
-            <a:off x="7417112" y="5316553"/>
-            <a:ext cx="1053019" cy="748787"/>
-          </a:xfrm>
-          <a:prstGeom prst="rect">
-            <a:avLst/>
-          </a:prstGeom>
-        </p:spPr>
-      </p:pic>
-      <p:pic>
-        <p:nvPicPr>
-          <p:cNvPr id="20" name="Imagen 19">
-            <a:extLst>
-              <a:ext uri="{FF2B5EF4-FFF2-40B4-BE49-F238E27FC236}">
-                <a16:creationId xmlns:a16="http://schemas.microsoft.com/office/drawing/2014/main" id="{BF732DA8-553B-BC48-080F-9FA76ACAC0A4}"/>
-              </a:ext>
-            </a:extLst>
-          </p:cNvPr>
-          <p:cNvPicPr>
-            <a:picLocks noChangeAspect="1"/>
-          </p:cNvPicPr>
-          <p:nvPr/>
-        </p:nvPicPr>
-        <p:blipFill>
-          <a:blip r:embed="rId5"/>
-          <a:stretch>
-            <a:fillRect/>
-          </a:stretch>
-        </p:blipFill>
-        <p:spPr>
-          <a:xfrm>
-            <a:off x="10482261" y="5278923"/>
-            <a:ext cx="679919" cy="688444"/>
-          </a:xfrm>
-          <a:prstGeom prst="rect">
-            <a:avLst/>
-          </a:prstGeom>
-        </p:spPr>
-      </p:pic>
-      <p:pic>
-        <p:nvPicPr>
-          <p:cNvPr id="23" name="Imagen 22">
-            <a:extLst>
-              <a:ext uri="{FF2B5EF4-FFF2-40B4-BE49-F238E27FC236}">
-                <a16:creationId xmlns:a16="http://schemas.microsoft.com/office/drawing/2014/main" id="{4AC9E127-121D-1A09-4242-E83C08370BF2}"/>
-              </a:ext>
-            </a:extLst>
-          </p:cNvPr>
-          <p:cNvPicPr>
-            <a:picLocks noChangeAspect="1"/>
-          </p:cNvPicPr>
-          <p:nvPr/>
-        </p:nvPicPr>
-        <p:blipFill>
-          <a:blip r:embed="rId6"/>
-          <a:stretch>
-            <a:fillRect/>
-          </a:stretch>
-        </p:blipFill>
-        <p:spPr>
-          <a:xfrm>
-            <a:off x="8945798" y="5256143"/>
-            <a:ext cx="799135" cy="809197"/>
-          </a:xfrm>
-          <a:prstGeom prst="rect">
-            <a:avLst/>
-          </a:prstGeom>
-        </p:spPr>
-      </p:pic>
-      <p:pic>
-        <p:nvPicPr>
-          <p:cNvPr id="24" name="Imagen 23">
-            <a:extLst>
-              <a:ext uri="{FF2B5EF4-FFF2-40B4-BE49-F238E27FC236}">
-                <a16:creationId xmlns:a16="http://schemas.microsoft.com/office/drawing/2014/main" id="{0D1B2C75-FA3D-1A44-9C54-029C9A9BC0ED}"/>
-              </a:ext>
-            </a:extLst>
-          </p:cNvPr>
-          <p:cNvPicPr>
-            <a:picLocks noChangeAspect="1"/>
-          </p:cNvPicPr>
-          <p:nvPr/>
-        </p:nvPicPr>
-        <p:blipFill>
-          <a:blip r:embed="rId7"/>
-          <a:stretch>
-            <a:fillRect/>
-          </a:stretch>
-        </p:blipFill>
-        <p:spPr>
-          <a:xfrm>
-            <a:off x="7284152" y="3101595"/>
-            <a:ext cx="1053019" cy="603829"/>
-          </a:xfrm>
-          <a:prstGeom prst="rect">
-            <a:avLst/>
-          </a:prstGeom>
-        </p:spPr>
-      </p:pic>
-      <p:pic>
-        <p:nvPicPr>
-          <p:cNvPr id="31" name="Imagen 30">
-            <a:extLst>
-              <a:ext uri="{FF2B5EF4-FFF2-40B4-BE49-F238E27FC236}">
-                <a16:creationId xmlns:a16="http://schemas.microsoft.com/office/drawing/2014/main" id="{CEA2CAEB-29B1-3B48-A82D-157D9DCDBD8F}"/>
-              </a:ext>
-            </a:extLst>
-          </p:cNvPr>
-          <p:cNvPicPr>
-            <a:picLocks noChangeAspect="1"/>
-          </p:cNvPicPr>
-          <p:nvPr/>
-        </p:nvPicPr>
-        <p:blipFill>
-          <a:blip r:embed="rId8"/>
-          <a:stretch>
-            <a:fillRect/>
-          </a:stretch>
-        </p:blipFill>
-        <p:spPr>
-          <a:xfrm>
-            <a:off x="1753647" y="5151398"/>
-            <a:ext cx="1519179" cy="862185"/>
-          </a:xfrm>
-          <a:prstGeom prst="rect">
-            <a:avLst/>
-          </a:prstGeom>
-        </p:spPr>
-      </p:pic>
-      <p:pic>
-        <p:nvPicPr>
-          <p:cNvPr id="5" name="Imagen 4" descr="Icono&#10;&#10;Descripción generada automáticamente">
-            <a:extLst>
-              <a:ext uri="{FF2B5EF4-FFF2-40B4-BE49-F238E27FC236}">
-                <a16:creationId xmlns:a16="http://schemas.microsoft.com/office/drawing/2014/main" id="{743DA302-01CD-DAF4-C6AC-73A93B30B266}"/>
-              </a:ext>
-            </a:extLst>
-          </p:cNvPr>
-          <p:cNvPicPr>
-            <a:picLocks noChangeAspect="1"/>
-          </p:cNvPicPr>
-          <p:nvPr/>
-        </p:nvPicPr>
-        <p:blipFill>
-          <a:blip r:embed="rId9">
-            <a:extLst>
-              <a:ext uri="{28A0092B-C50C-407E-A947-70E740481C1C}">
-                <a14:useLocalDpi xmlns:a14="http://schemas.microsoft.com/office/drawing/2010/main" val="0"/>
-              </a:ext>
-            </a:extLst>
-          </a:blip>
-          <a:stretch>
-            <a:fillRect/>
-          </a:stretch>
-        </p:blipFill>
-        <p:spPr>
-          <a:xfrm>
-            <a:off x="1782925" y="3101595"/>
-            <a:ext cx="1160878" cy="730897"/>
-          </a:xfrm>
-          <a:prstGeom prst="rect">
-            <a:avLst/>
-          </a:prstGeom>
-        </p:spPr>
-      </p:pic>
-      <p:pic>
-        <p:nvPicPr>
-          <p:cNvPr id="10" name="Imagen 9" descr="Imagen que contiene Diagrama&#10;&#10;Descripción generada automáticamente">
-            <a:extLst>
-              <a:ext uri="{FF2B5EF4-FFF2-40B4-BE49-F238E27FC236}">
-                <a16:creationId xmlns:a16="http://schemas.microsoft.com/office/drawing/2014/main" id="{0DB09EC2-55C0-AAC1-430F-9D1871943AE0}"/>
-              </a:ext>
-            </a:extLst>
-          </p:cNvPr>
-          <p:cNvPicPr>
-            <a:picLocks noChangeAspect="1"/>
-          </p:cNvPicPr>
-          <p:nvPr/>
-        </p:nvPicPr>
-        <p:blipFill>
-          <a:blip r:embed="rId10">
-            <a:extLst>
-              <a:ext uri="{28A0092B-C50C-407E-A947-70E740481C1C}">
-                <a14:useLocalDpi xmlns:a14="http://schemas.microsoft.com/office/drawing/2010/main" val="0"/>
-              </a:ext>
-            </a:extLst>
-          </a:blip>
-          <a:stretch>
-            <a:fillRect/>
-          </a:stretch>
-        </p:blipFill>
-        <p:spPr>
-          <a:xfrm>
-            <a:off x="4500664" y="3016004"/>
-            <a:ext cx="795942" cy="935446"/>
-          </a:xfrm>
-          <a:prstGeom prst="rect">
-            <a:avLst/>
-          </a:prstGeom>
-        </p:spPr>
-      </p:pic>
-      <p:sp>
-        <p:nvSpPr>
-          <p:cNvPr id="12" name="CuadroTexto 11">
-            <a:extLst>
-              <a:ext uri="{FF2B5EF4-FFF2-40B4-BE49-F238E27FC236}">
-                <a16:creationId xmlns:a16="http://schemas.microsoft.com/office/drawing/2014/main" id="{C1F36753-112A-5C75-2A7F-335DB726A84B}"/>
-              </a:ext>
-            </a:extLst>
-          </p:cNvPr>
-          <p:cNvSpPr txBox="1"/>
-          <p:nvPr/>
-        </p:nvSpPr>
-        <p:spPr>
-          <a:xfrm>
-            <a:off x="2227312" y="2671199"/>
-            <a:ext cx="3152225" cy="369332"/>
-          </a:xfrm>
-          <a:prstGeom prst="rect">
-            <a:avLst/>
-          </a:prstGeom>
-          <a:noFill/>
-          <a:ln>
-            <a:solidFill>
-              <a:schemeClr val="bg1"/>
-            </a:solidFill>
-          </a:ln>
-        </p:spPr>
-        <p:txBody>
-          <a:bodyPr wrap="square" rtlCol="0">
-            <a:spAutoFit/>
-          </a:bodyPr>
-          <a:lstStyle/>
-          <a:p>
-            <a:r>
-              <a:rPr lang="es-VE" dirty="0"/>
-              <a:t>Comprensión del Problema</a:t>
-            </a:r>
-            <a:endParaRPr lang="es-ES" dirty="0"/>
-          </a:p>
-        </p:txBody>
-      </p:sp>
-      <p:sp>
-        <p:nvSpPr>
-          <p:cNvPr id="13" name="CuadroTexto 12">
-            <a:extLst>
-              <a:ext uri="{FF2B5EF4-FFF2-40B4-BE49-F238E27FC236}">
-                <a16:creationId xmlns:a16="http://schemas.microsoft.com/office/drawing/2014/main" id="{E57F7C19-71FE-E6C8-1B04-7C6EC2520B62}"/>
-              </a:ext>
-            </a:extLst>
-          </p:cNvPr>
-          <p:cNvSpPr txBox="1"/>
-          <p:nvPr/>
-        </p:nvSpPr>
-        <p:spPr>
-          <a:xfrm>
-            <a:off x="7914373" y="2591863"/>
-            <a:ext cx="2663004" cy="369332"/>
-          </a:xfrm>
-          <a:prstGeom prst="rect">
-            <a:avLst/>
-          </a:prstGeom>
-          <a:noFill/>
-        </p:spPr>
-        <p:txBody>
-          <a:bodyPr wrap="square" rtlCol="0">
-            <a:spAutoFit/>
-          </a:bodyPr>
-          <a:lstStyle/>
-          <a:p>
-            <a:r>
-              <a:rPr lang="es-VE" dirty="0"/>
-              <a:t>Comprensión de los datos</a:t>
-            </a:r>
-            <a:endParaRPr lang="es-ES" dirty="0"/>
-          </a:p>
-        </p:txBody>
-      </p:sp>
-      <p:sp>
-        <p:nvSpPr>
-          <p:cNvPr id="14" name="CuadroTexto 13">
-            <a:extLst>
-              <a:ext uri="{FF2B5EF4-FFF2-40B4-BE49-F238E27FC236}">
-                <a16:creationId xmlns:a16="http://schemas.microsoft.com/office/drawing/2014/main" id="{36777DC1-8DC6-1417-543C-2C29687C263A}"/>
-              </a:ext>
-            </a:extLst>
-          </p:cNvPr>
-          <p:cNvSpPr txBox="1"/>
-          <p:nvPr/>
-        </p:nvSpPr>
-        <p:spPr>
-          <a:xfrm>
-            <a:off x="8053787" y="4859466"/>
-            <a:ext cx="2577440" cy="332968"/>
-          </a:xfrm>
-          <a:prstGeom prst="rect">
-            <a:avLst/>
-          </a:prstGeom>
-          <a:noFill/>
-        </p:spPr>
-        <p:txBody>
-          <a:bodyPr wrap="square" rtlCol="0">
-            <a:spAutoFit/>
-          </a:bodyPr>
-          <a:lstStyle/>
-          <a:p>
-            <a:r>
-              <a:rPr lang="es-VE" dirty="0"/>
-              <a:t>Preparación de los datos</a:t>
-            </a:r>
-            <a:endParaRPr lang="es-ES" dirty="0"/>
-          </a:p>
-        </p:txBody>
-      </p:sp>
-      <p:sp>
-        <p:nvSpPr>
-          <p:cNvPr id="27" name="Flecha: a la derecha 26">
-            <a:extLst>
-              <a:ext uri="{FF2B5EF4-FFF2-40B4-BE49-F238E27FC236}">
-                <a16:creationId xmlns:a16="http://schemas.microsoft.com/office/drawing/2014/main" id="{E6E9DDB4-D82E-3873-26AF-2A12A32380A1}"/>
-              </a:ext>
-            </a:extLst>
-          </p:cNvPr>
-          <p:cNvSpPr/>
-          <p:nvPr/>
-        </p:nvSpPr>
-        <p:spPr>
-          <a:xfrm>
-            <a:off x="6143519" y="3278782"/>
-            <a:ext cx="930028" cy="519893"/>
-          </a:xfrm>
-          <a:prstGeom prst="rightArrow">
-            <a:avLst/>
-          </a:prstGeom>
-        </p:spPr>
-        <p:style>
-          <a:lnRef idx="2">
-            <a:schemeClr val="accent1">
-              <a:shade val="15000"/>
-            </a:schemeClr>
-          </a:lnRef>
-          <a:fillRef idx="1">
-            <a:schemeClr val="accent1"/>
-          </a:fillRef>
-          <a:effectRef idx="0">
-            <a:schemeClr val="accent1"/>
-          </a:effectRef>
-          <a:fontRef idx="minor">
-            <a:schemeClr val="lt1"/>
-          </a:fontRef>
-        </p:style>
-        <p:txBody>
-          <a:bodyPr rtlCol="0" anchor="ctr"/>
-          <a:lstStyle/>
-          <a:p>
-            <a:pPr algn="ctr"/>
-            <a:endParaRPr lang="es-ES"/>
-          </a:p>
-        </p:txBody>
-      </p:sp>
-      <p:sp>
-        <p:nvSpPr>
-          <p:cNvPr id="35" name="Flecha: a la derecha 34">
-            <a:extLst>
-              <a:ext uri="{FF2B5EF4-FFF2-40B4-BE49-F238E27FC236}">
-                <a16:creationId xmlns:a16="http://schemas.microsoft.com/office/drawing/2014/main" id="{3A77BEE8-E194-2010-B7C4-2681488AA4B7}"/>
-              </a:ext>
-            </a:extLst>
-          </p:cNvPr>
-          <p:cNvSpPr/>
-          <p:nvPr/>
-        </p:nvSpPr>
-        <p:spPr>
-          <a:xfrm rot="10800000">
-            <a:off x="6131618" y="5040563"/>
-            <a:ext cx="850632" cy="519893"/>
-          </a:xfrm>
-          <a:prstGeom prst="rightArrow">
-            <a:avLst/>
-          </a:prstGeom>
-        </p:spPr>
-        <p:style>
-          <a:lnRef idx="2">
-            <a:schemeClr val="accent1">
-              <a:shade val="15000"/>
-            </a:schemeClr>
-          </a:lnRef>
-          <a:fillRef idx="1">
-            <a:schemeClr val="accent1"/>
-          </a:fillRef>
-          <a:effectRef idx="0">
-            <a:schemeClr val="accent1"/>
-          </a:effectRef>
-          <a:fontRef idx="minor">
-            <a:schemeClr val="lt1"/>
-          </a:fontRef>
-        </p:style>
-        <p:txBody>
-          <a:bodyPr rtlCol="0" anchor="ctr"/>
-          <a:lstStyle/>
-          <a:p>
-            <a:pPr algn="ctr"/>
-            <a:endParaRPr lang="es-ES"/>
-          </a:p>
-        </p:txBody>
-      </p:sp>
-      <p:sp>
-        <p:nvSpPr>
-          <p:cNvPr id="36" name="Flecha: a la derecha 35">
-            <a:extLst>
-              <a:ext uri="{FF2B5EF4-FFF2-40B4-BE49-F238E27FC236}">
-                <a16:creationId xmlns:a16="http://schemas.microsoft.com/office/drawing/2014/main" id="{95F638AF-CC0E-7459-76E3-A60063C182C6}"/>
-              </a:ext>
-            </a:extLst>
-          </p:cNvPr>
-          <p:cNvSpPr/>
-          <p:nvPr/>
-        </p:nvSpPr>
-        <p:spPr>
-          <a:xfrm rot="5400000">
-            <a:off x="8982324" y="4301229"/>
-            <a:ext cx="707863" cy="519893"/>
-          </a:xfrm>
-          <a:prstGeom prst="rightArrow">
-            <a:avLst/>
-          </a:prstGeom>
-        </p:spPr>
-        <p:style>
-          <a:lnRef idx="2">
-            <a:schemeClr val="accent1">
-              <a:shade val="15000"/>
-            </a:schemeClr>
-          </a:lnRef>
-          <a:fillRef idx="1">
-            <a:schemeClr val="accent1"/>
-          </a:fillRef>
-          <a:effectRef idx="0">
-            <a:schemeClr val="accent1"/>
-          </a:effectRef>
-          <a:fontRef idx="minor">
-            <a:schemeClr val="lt1"/>
-          </a:fontRef>
-        </p:style>
-        <p:txBody>
-          <a:bodyPr rtlCol="0" anchor="ctr"/>
-          <a:lstStyle/>
-          <a:p>
-            <a:pPr algn="ctr"/>
-            <a:endParaRPr lang="es-ES"/>
-          </a:p>
-        </p:txBody>
-      </p:sp>
-      <p:sp>
-        <p:nvSpPr>
-          <p:cNvPr id="33" name="CuadroTexto 32">
-            <a:extLst>
-              <a:ext uri="{FF2B5EF4-FFF2-40B4-BE49-F238E27FC236}">
-                <a16:creationId xmlns:a16="http://schemas.microsoft.com/office/drawing/2014/main" id="{C33319EE-8A35-BDE5-E268-F83D2A81A8E5}"/>
-              </a:ext>
-            </a:extLst>
-          </p:cNvPr>
-          <p:cNvSpPr txBox="1"/>
-          <p:nvPr/>
-        </p:nvSpPr>
-        <p:spPr>
-          <a:xfrm>
-            <a:off x="7560710" y="1564200"/>
-            <a:ext cx="2857292" cy="307777"/>
-          </a:xfrm>
-          <a:prstGeom prst="rect">
-            <a:avLst/>
-          </a:prstGeom>
-          <a:noFill/>
-        </p:spPr>
-        <p:txBody>
-          <a:bodyPr wrap="square" rtlCol="0">
-            <a:spAutoFit/>
-          </a:bodyPr>
-          <a:lstStyle/>
-          <a:p>
-            <a:r>
-              <a:rPr lang="es-VE" sz="1400" dirty="0"/>
-              <a:t>Plataforma de control de versiones</a:t>
-            </a:r>
-            <a:endParaRPr lang="es-ES" sz="1400" dirty="0"/>
-          </a:p>
-        </p:txBody>
-      </p:sp>
-      <p:pic>
-        <p:nvPicPr>
-          <p:cNvPr id="21" name="Imagen 20">
-            <a:extLst>
-              <a:ext uri="{FF2B5EF4-FFF2-40B4-BE49-F238E27FC236}">
-                <a16:creationId xmlns:a16="http://schemas.microsoft.com/office/drawing/2014/main" id="{5D28DEA3-BC70-D71F-A715-73742B25BFF9}"/>
-              </a:ext>
-            </a:extLst>
-          </p:cNvPr>
-          <p:cNvPicPr>
-            <a:picLocks noChangeAspect="1"/>
-          </p:cNvPicPr>
-          <p:nvPr/>
-        </p:nvPicPr>
-        <p:blipFill rotWithShape="1">
-          <a:blip r:embed="rId11">
-            <a:alphaModFix/>
-          </a:blip>
-          <a:srcRect r="9656"/>
-          <a:stretch/>
-        </p:blipFill>
-        <p:spPr>
-          <a:xfrm>
-            <a:off x="3422104" y="836156"/>
-            <a:ext cx="728655" cy="810719"/>
-          </a:xfrm>
-          <a:prstGeom prst="rect">
-            <a:avLst/>
-          </a:prstGeom>
-          <a:noFill/>
-        </p:spPr>
-      </p:pic>
-      <p:pic>
-        <p:nvPicPr>
-          <p:cNvPr id="25" name="Imagen 24">
-            <a:extLst>
-              <a:ext uri="{FF2B5EF4-FFF2-40B4-BE49-F238E27FC236}">
-                <a16:creationId xmlns:a16="http://schemas.microsoft.com/office/drawing/2014/main" id="{9754C956-4315-0D0A-55DC-4E4014AA7145}"/>
-              </a:ext>
-            </a:extLst>
-          </p:cNvPr>
-          <p:cNvPicPr>
-            <a:picLocks noChangeAspect="1"/>
-          </p:cNvPicPr>
-          <p:nvPr/>
-        </p:nvPicPr>
-        <p:blipFill>
-          <a:blip r:embed="rId12"/>
-          <a:stretch>
-            <a:fillRect/>
-          </a:stretch>
-        </p:blipFill>
-        <p:spPr>
-          <a:xfrm>
-            <a:off x="8394270" y="857555"/>
-            <a:ext cx="1076512" cy="607346"/>
-          </a:xfrm>
-          <a:prstGeom prst="rect">
-            <a:avLst/>
-          </a:prstGeom>
-          <a:noFill/>
-        </p:spPr>
-      </p:pic>
-      <p:sp>
-        <p:nvSpPr>
-          <p:cNvPr id="32" name="CuadroTexto 31">
-            <a:extLst>
-              <a:ext uri="{FF2B5EF4-FFF2-40B4-BE49-F238E27FC236}">
-                <a16:creationId xmlns:a16="http://schemas.microsoft.com/office/drawing/2014/main" id="{52054116-1532-8CD3-A089-A447296BD0CC}"/>
-              </a:ext>
-            </a:extLst>
-          </p:cNvPr>
-          <p:cNvSpPr txBox="1"/>
-          <p:nvPr/>
-        </p:nvSpPr>
-        <p:spPr>
-          <a:xfrm>
-            <a:off x="2853488" y="1592961"/>
-            <a:ext cx="2014765" cy="307777"/>
-          </a:xfrm>
-          <a:prstGeom prst="rect">
-            <a:avLst/>
-          </a:prstGeom>
-          <a:noFill/>
-        </p:spPr>
-        <p:txBody>
-          <a:bodyPr wrap="square" rtlCol="0">
-            <a:spAutoFit/>
-          </a:bodyPr>
-          <a:lstStyle/>
-          <a:p>
-            <a:r>
-              <a:rPr lang="es-VE" sz="1400" dirty="0"/>
-              <a:t>Editor de código fuente</a:t>
-            </a:r>
-            <a:endParaRPr lang="es-ES" sz="1400" dirty="0"/>
-          </a:p>
-        </p:txBody>
-      </p:sp>
-      <p:sp>
-        <p:nvSpPr>
-          <p:cNvPr id="39" name="CuadroTexto 38">
-            <a:extLst>
-              <a:ext uri="{FF2B5EF4-FFF2-40B4-BE49-F238E27FC236}">
-                <a16:creationId xmlns:a16="http://schemas.microsoft.com/office/drawing/2014/main" id="{8D8A213B-6128-3905-EC8C-0DF1749088C5}"/>
-              </a:ext>
-            </a:extLst>
-          </p:cNvPr>
-          <p:cNvSpPr txBox="1"/>
-          <p:nvPr/>
-        </p:nvSpPr>
-        <p:spPr>
-          <a:xfrm>
-            <a:off x="5488685" y="426307"/>
-            <a:ext cx="1800000" cy="369332"/>
-          </a:xfrm>
-          <a:prstGeom prst="rect">
-            <a:avLst/>
-          </a:prstGeom>
-          <a:noFill/>
-        </p:spPr>
-        <p:txBody>
-          <a:bodyPr wrap="square" rtlCol="0">
-            <a:spAutoFit/>
-          </a:bodyPr>
-          <a:lstStyle/>
-          <a:p>
-            <a:pPr algn="ctr"/>
-            <a:r>
-              <a:rPr lang="es-VE" b="1" dirty="0"/>
-              <a:t>Herramientas</a:t>
-            </a:r>
-            <a:endParaRPr lang="es-ES" b="1" dirty="0"/>
-          </a:p>
-        </p:txBody>
-      </p:sp>
-      <p:sp>
-        <p:nvSpPr>
-          <p:cNvPr id="3" name="CuadroTexto 2">
-            <a:extLst>
-              <a:ext uri="{FF2B5EF4-FFF2-40B4-BE49-F238E27FC236}">
-                <a16:creationId xmlns:a16="http://schemas.microsoft.com/office/drawing/2014/main" id="{9458BE3E-2561-6CA3-5700-9DF68B4EEA00}"/>
-              </a:ext>
-            </a:extLst>
-          </p:cNvPr>
-          <p:cNvSpPr txBox="1"/>
-          <p:nvPr/>
-        </p:nvSpPr>
-        <p:spPr>
-          <a:xfrm>
-            <a:off x="2151758" y="3904971"/>
-            <a:ext cx="2874954" cy="307777"/>
-          </a:xfrm>
-          <a:prstGeom prst="rect">
-            <a:avLst/>
-          </a:prstGeom>
-          <a:noFill/>
-        </p:spPr>
-        <p:txBody>
-          <a:bodyPr wrap="none" rtlCol="0">
-            <a:spAutoFit/>
-          </a:bodyPr>
-          <a:lstStyle/>
-          <a:p>
-            <a:r>
-              <a:rPr lang="es-VE" sz="1400" dirty="0"/>
-              <a:t>Análisis y Jerarquización de Impactos</a:t>
-            </a:r>
-            <a:endParaRPr lang="es-ES" sz="1400" dirty="0"/>
-          </a:p>
-        </p:txBody>
-      </p:sp>
-      <p:sp>
-        <p:nvSpPr>
-          <p:cNvPr id="6" name="CuadroTexto 5">
-            <a:extLst>
-              <a:ext uri="{FF2B5EF4-FFF2-40B4-BE49-F238E27FC236}">
-                <a16:creationId xmlns:a16="http://schemas.microsoft.com/office/drawing/2014/main" id="{CDBF862F-9240-AE68-37BF-F8B40000109E}"/>
-              </a:ext>
-            </a:extLst>
-          </p:cNvPr>
-          <p:cNvSpPr txBox="1"/>
-          <p:nvPr/>
-        </p:nvSpPr>
-        <p:spPr>
-          <a:xfrm>
-            <a:off x="7914373" y="3824770"/>
-            <a:ext cx="3052947" cy="307777"/>
-          </a:xfrm>
-          <a:prstGeom prst="rect">
-            <a:avLst/>
-          </a:prstGeom>
-          <a:noFill/>
-        </p:spPr>
-        <p:txBody>
-          <a:bodyPr wrap="square" rtlCol="0">
-            <a:spAutoFit/>
-          </a:bodyPr>
-          <a:lstStyle/>
-          <a:p>
-            <a:r>
-              <a:rPr lang="es-VE" sz="1400" dirty="0"/>
-              <a:t>Análisis, visualización y limpieza inicial</a:t>
-            </a:r>
-            <a:endParaRPr lang="es-ES" sz="1400" dirty="0"/>
-          </a:p>
-        </p:txBody>
-      </p:sp>
-      <p:pic>
-        <p:nvPicPr>
-          <p:cNvPr id="8" name="Imagen 7" descr="Fondo negro con letras blancas&#10;&#10;Descripción generada automáticamente con confianza media">
-            <a:extLst>
-              <a:ext uri="{FF2B5EF4-FFF2-40B4-BE49-F238E27FC236}">
-                <a16:creationId xmlns:a16="http://schemas.microsoft.com/office/drawing/2014/main" id="{07559A14-873B-223B-4BCF-F21EC40060DE}"/>
-              </a:ext>
-            </a:extLst>
-          </p:cNvPr>
-          <p:cNvPicPr>
-            <a:picLocks noChangeAspect="1"/>
-          </p:cNvPicPr>
-          <p:nvPr/>
-        </p:nvPicPr>
-        <p:blipFill>
-          <a:blip r:embed="rId13">
-            <a:extLst>
-              <a:ext uri="{28A0092B-C50C-407E-A947-70E740481C1C}">
-                <a14:useLocalDpi xmlns:a14="http://schemas.microsoft.com/office/drawing/2010/main" val="0"/>
-              </a:ext>
-            </a:extLst>
-          </a:blip>
-          <a:stretch>
-            <a:fillRect/>
-          </a:stretch>
-        </p:blipFill>
-        <p:spPr>
-          <a:xfrm>
-            <a:off x="10967320" y="3133042"/>
-            <a:ext cx="516498" cy="523478"/>
-          </a:xfrm>
-          <a:prstGeom prst="rect">
-            <a:avLst/>
-          </a:prstGeom>
-        </p:spPr>
-      </p:pic>
-      <p:pic>
-        <p:nvPicPr>
-          <p:cNvPr id="11" name="Imagen 10" descr="Icono&#10;&#10;Descripción generada automáticamente">
-            <a:extLst>
-              <a:ext uri="{FF2B5EF4-FFF2-40B4-BE49-F238E27FC236}">
-                <a16:creationId xmlns:a16="http://schemas.microsoft.com/office/drawing/2014/main" id="{82780D3A-5A6D-711F-FC7A-80AEC70252DF}"/>
-              </a:ext>
-            </a:extLst>
-          </p:cNvPr>
-          <p:cNvPicPr>
-            <a:picLocks noChangeAspect="1"/>
-          </p:cNvPicPr>
-          <p:nvPr/>
-        </p:nvPicPr>
-        <p:blipFill>
-          <a:blip r:embed="rId14">
-            <a:extLst>
-              <a:ext uri="{28A0092B-C50C-407E-A947-70E740481C1C}">
-                <a14:useLocalDpi xmlns:a14="http://schemas.microsoft.com/office/drawing/2010/main" val="0"/>
-              </a:ext>
-            </a:extLst>
-          </a:blip>
-          <a:stretch>
-            <a:fillRect/>
-          </a:stretch>
-        </p:blipFill>
-        <p:spPr>
-          <a:xfrm>
-            <a:off x="9690229" y="3067778"/>
-            <a:ext cx="748196" cy="748196"/>
-          </a:xfrm>
-          <a:prstGeom prst="rect">
-            <a:avLst/>
-          </a:prstGeom>
-        </p:spPr>
-      </p:pic>
-      <p:sp>
-        <p:nvSpPr>
-          <p:cNvPr id="15" name="CuadroTexto 14">
-            <a:extLst>
-              <a:ext uri="{FF2B5EF4-FFF2-40B4-BE49-F238E27FC236}">
-                <a16:creationId xmlns:a16="http://schemas.microsoft.com/office/drawing/2014/main" id="{4BA62170-B33B-432C-9878-D14F45790500}"/>
-              </a:ext>
-            </a:extLst>
-          </p:cNvPr>
-          <p:cNvSpPr txBox="1"/>
-          <p:nvPr/>
-        </p:nvSpPr>
-        <p:spPr>
-          <a:xfrm>
-            <a:off x="7914373" y="6151829"/>
-            <a:ext cx="3502158" cy="307777"/>
-          </a:xfrm>
-          <a:prstGeom prst="rect">
-            <a:avLst/>
-          </a:prstGeom>
-          <a:noFill/>
-        </p:spPr>
-        <p:txBody>
-          <a:bodyPr wrap="square" rtlCol="0">
-            <a:spAutoFit/>
-          </a:bodyPr>
-          <a:lstStyle/>
-          <a:p>
-            <a:r>
-              <a:rPr lang="es-VE" sz="1400" dirty="0"/>
-              <a:t>Tratamiento de nulos, </a:t>
-            </a:r>
-            <a:r>
-              <a:rPr lang="es-VE" sz="1400" dirty="0" err="1"/>
-              <a:t>outliers</a:t>
-            </a:r>
-            <a:r>
-              <a:rPr lang="es-VE" sz="1400" dirty="0"/>
-              <a:t>, balanceos…</a:t>
-            </a:r>
-            <a:endParaRPr lang="es-ES" sz="1400" dirty="0"/>
-          </a:p>
-        </p:txBody>
-      </p:sp>
-      <p:sp>
-        <p:nvSpPr>
-          <p:cNvPr id="18" name="CuadroTexto 17">
-            <a:extLst>
-              <a:ext uri="{FF2B5EF4-FFF2-40B4-BE49-F238E27FC236}">
-                <a16:creationId xmlns:a16="http://schemas.microsoft.com/office/drawing/2014/main" id="{25FEB2F4-C039-5DBB-34FF-6EE72A821587}"/>
-              </a:ext>
-            </a:extLst>
-          </p:cNvPr>
-          <p:cNvSpPr txBox="1"/>
-          <p:nvPr/>
-        </p:nvSpPr>
-        <p:spPr>
-          <a:xfrm>
-            <a:off x="1595703" y="5972512"/>
-            <a:ext cx="2204446" cy="523220"/>
-          </a:xfrm>
-          <a:prstGeom prst="rect">
-            <a:avLst/>
-          </a:prstGeom>
-          <a:noFill/>
-        </p:spPr>
-        <p:txBody>
-          <a:bodyPr wrap="square" rtlCol="0">
-            <a:spAutoFit/>
-          </a:bodyPr>
-          <a:lstStyle/>
-          <a:p>
-            <a:pPr algn="ctr"/>
-            <a:r>
-              <a:rPr lang="es-VE" sz="1400" dirty="0" err="1"/>
-              <a:t>Dashboard</a:t>
-            </a:r>
-            <a:endParaRPr lang="es-VE" sz="1400" dirty="0"/>
-          </a:p>
-          <a:p>
-            <a:pPr algn="ctr"/>
-            <a:r>
-              <a:rPr lang="es-VE" sz="1400" dirty="0"/>
-              <a:t>Visualizaciones interactivas</a:t>
-            </a:r>
-            <a:endParaRPr lang="es-ES" sz="1400" dirty="0"/>
-          </a:p>
-        </p:txBody>
-      </p:sp>
-      <p:sp>
-        <p:nvSpPr>
-          <p:cNvPr id="34" name="CuadroTexto 33">
-            <a:extLst>
-              <a:ext uri="{FF2B5EF4-FFF2-40B4-BE49-F238E27FC236}">
-                <a16:creationId xmlns:a16="http://schemas.microsoft.com/office/drawing/2014/main" id="{1C588EB2-AB9A-65A6-30F7-55AC8DD85B95}"/>
-              </a:ext>
-            </a:extLst>
-          </p:cNvPr>
-          <p:cNvSpPr txBox="1"/>
-          <p:nvPr/>
-        </p:nvSpPr>
-        <p:spPr>
-          <a:xfrm>
-            <a:off x="3264441" y="4875394"/>
-            <a:ext cx="1199955" cy="369332"/>
-          </a:xfrm>
-          <a:prstGeom prst="rect">
-            <a:avLst/>
-          </a:prstGeom>
-          <a:noFill/>
-          <a:ln>
-            <a:solidFill>
-              <a:schemeClr val="bg1"/>
-            </a:solidFill>
-          </a:ln>
-        </p:spPr>
-        <p:txBody>
-          <a:bodyPr wrap="square" rtlCol="0">
-            <a:spAutoFit/>
-          </a:bodyPr>
-          <a:lstStyle/>
-          <a:p>
-            <a:r>
-              <a:rPr lang="es-VE" dirty="0"/>
-              <a:t>Modelado</a:t>
-            </a:r>
-            <a:endParaRPr lang="es-ES" dirty="0"/>
-          </a:p>
-        </p:txBody>
-      </p:sp>
-    </p:spTree>
-    <p:extLst>
-      <p:ext uri="{BB962C8B-B14F-4D97-AF65-F5344CB8AC3E}">
-        <p14:creationId xmlns:p14="http://schemas.microsoft.com/office/powerpoint/2010/main" val="218210802"/>
-      </p:ext>
-    </p:extLst>
-  </p:cSld>
-  <p:clrMapOvr>
-    <a:masterClrMapping/>
-  </p:clrMapOvr>
-</p:sld>
-</file>
-
 <file path=ppt/slides/slide7.xml><?xml version="1.0" encoding="utf-8"?>
 <p:sld xmlns:a="http://schemas.openxmlformats.org/drawingml/2006/main" xmlns:r="http://schemas.openxmlformats.org/officeDocument/2006/relationships" xmlns:p="http://schemas.openxmlformats.org/presentationml/2006/main">
   <p:cSld>
@@ -7738,10 +6540,10 @@
       </p:grpSpPr>
       <p:sp>
         <p:nvSpPr>
-          <p:cNvPr id="2" name="CuadroTexto 1">
-            <a:extLst>
-              <a:ext uri="{FF2B5EF4-FFF2-40B4-BE49-F238E27FC236}">
-                <a16:creationId xmlns:a16="http://schemas.microsoft.com/office/drawing/2014/main" id="{4B687CEC-3602-8832-94DB-CD4D242AB79B}"/>
+          <p:cNvPr id="4" name="CuadroTexto 3">
+            <a:extLst>
+              <a:ext uri="{FF2B5EF4-FFF2-40B4-BE49-F238E27FC236}">
+                <a16:creationId xmlns:a16="http://schemas.microsoft.com/office/drawing/2014/main" id="{BE3FAE17-F51D-057F-6684-A6075E80CF95}"/>
               </a:ext>
             </a:extLst>
           </p:cNvPr>
@@ -7750,8 +6552,8 @@
         </p:nvSpPr>
         <p:spPr>
           <a:xfrm>
-            <a:off x="1056000" y="549000"/>
-            <a:ext cx="9000000" cy="369332"/>
+            <a:off x="336000" y="221161"/>
+            <a:ext cx="1440000" cy="461665"/>
           </a:xfrm>
           <a:prstGeom prst="rect">
             <a:avLst/>
@@ -7765,19 +6567,328 @@
           <a:lstStyle/>
           <a:p>
             <a:r>
-              <a:rPr lang="es-VE" dirty="0"/>
-              <a:t>EDA de base de datos completa de Desastres Naturales, pegado sencillo</a:t>
-            </a:r>
+              <a:rPr lang="es-VE" sz="2400" b="1" dirty="0"/>
+              <a:t>Proceso</a:t>
+            </a:r>
+            <a:endParaRPr lang="es-ES" sz="2400" b="1" dirty="0"/>
+          </a:p>
+        </p:txBody>
+      </p:sp>
+      <p:sp>
+        <p:nvSpPr>
+          <p:cNvPr id="37" name="CuadroTexto 36">
+            <a:extLst>
+              <a:ext uri="{FF2B5EF4-FFF2-40B4-BE49-F238E27FC236}">
+                <a16:creationId xmlns:a16="http://schemas.microsoft.com/office/drawing/2014/main" id="{E03CC5C9-BF20-B42E-CB28-440A255F4277}"/>
+              </a:ext>
+            </a:extLst>
+          </p:cNvPr>
+          <p:cNvSpPr txBox="1"/>
+          <p:nvPr/>
+        </p:nvSpPr>
+        <p:spPr>
+          <a:xfrm>
+            <a:off x="5837718" y="2059871"/>
+            <a:ext cx="1380834" cy="369332"/>
+          </a:xfrm>
+          <a:prstGeom prst="rect">
+            <a:avLst/>
+          </a:prstGeom>
+          <a:noFill/>
+        </p:spPr>
+        <p:txBody>
+          <a:bodyPr wrap="square" rtlCol="0">
+            <a:spAutoFit/>
+          </a:bodyPr>
+          <a:lstStyle/>
+          <a:p>
+            <a:r>
+              <a:rPr lang="es-VE" b="1" dirty="0"/>
+              <a:t>Aplicaciones</a:t>
+            </a:r>
+            <a:endParaRPr lang="es-ES" b="1" dirty="0"/>
+          </a:p>
+        </p:txBody>
+      </p:sp>
+      <p:sp>
+        <p:nvSpPr>
+          <p:cNvPr id="48" name="Rectángulo 47">
+            <a:extLst>
+              <a:ext uri="{FF2B5EF4-FFF2-40B4-BE49-F238E27FC236}">
+                <a16:creationId xmlns:a16="http://schemas.microsoft.com/office/drawing/2014/main" id="{8EADD379-A001-CDC6-33A9-655A8C64A230}"/>
+              </a:ext>
+            </a:extLst>
+          </p:cNvPr>
+          <p:cNvSpPr/>
+          <p:nvPr/>
+        </p:nvSpPr>
+        <p:spPr>
+          <a:xfrm>
+            <a:off x="1432186" y="4922261"/>
+            <a:ext cx="4649166" cy="1551681"/>
+          </a:xfrm>
+          <a:prstGeom prst="rect">
+            <a:avLst/>
+          </a:prstGeom>
+          <a:solidFill>
+            <a:srgbClr val="ECF5E7">
+              <a:alpha val="70000"/>
+            </a:srgbClr>
+          </a:solidFill>
+          <a:ln>
+            <a:noFill/>
+          </a:ln>
+        </p:spPr>
+        <p:style>
+          <a:lnRef idx="2">
+            <a:schemeClr val="accent1">
+              <a:shade val="15000"/>
+            </a:schemeClr>
+          </a:lnRef>
+          <a:fillRef idx="1">
+            <a:schemeClr val="accent1"/>
+          </a:fillRef>
+          <a:effectRef idx="0">
+            <a:schemeClr val="accent1"/>
+          </a:effectRef>
+          <a:fontRef idx="minor">
+            <a:schemeClr val="lt1"/>
+          </a:fontRef>
+        </p:style>
+        <p:txBody>
+          <a:bodyPr rtlCol="0" anchor="ctr"/>
+          <a:lstStyle/>
+          <a:p>
+            <a:pPr algn="ctr"/>
+            <a:endParaRPr lang="es-ES"/>
+          </a:p>
+        </p:txBody>
+      </p:sp>
+      <p:sp>
+        <p:nvSpPr>
+          <p:cNvPr id="46" name="Rectángulo 45">
+            <a:extLst>
+              <a:ext uri="{FF2B5EF4-FFF2-40B4-BE49-F238E27FC236}">
+                <a16:creationId xmlns:a16="http://schemas.microsoft.com/office/drawing/2014/main" id="{10AC415C-D855-1B76-5AC8-4E80324D902D}"/>
+              </a:ext>
+            </a:extLst>
+          </p:cNvPr>
+          <p:cNvSpPr/>
+          <p:nvPr/>
+        </p:nvSpPr>
+        <p:spPr>
+          <a:xfrm>
+            <a:off x="7019001" y="4915107"/>
+            <a:ext cx="4634506" cy="1551681"/>
+          </a:xfrm>
+          <a:prstGeom prst="rect">
+            <a:avLst/>
+          </a:prstGeom>
+          <a:solidFill>
+            <a:srgbClr val="ECF5E7">
+              <a:alpha val="70000"/>
+            </a:srgbClr>
+          </a:solidFill>
+          <a:ln>
+            <a:noFill/>
+          </a:ln>
+        </p:spPr>
+        <p:style>
+          <a:lnRef idx="2">
+            <a:schemeClr val="accent1">
+              <a:shade val="15000"/>
+            </a:schemeClr>
+          </a:lnRef>
+          <a:fillRef idx="1">
+            <a:schemeClr val="accent1"/>
+          </a:fillRef>
+          <a:effectRef idx="0">
+            <a:schemeClr val="accent1"/>
+          </a:effectRef>
+          <a:fontRef idx="minor">
+            <a:schemeClr val="lt1"/>
+          </a:fontRef>
+        </p:style>
+        <p:txBody>
+          <a:bodyPr rtlCol="0" anchor="ctr"/>
+          <a:lstStyle/>
+          <a:p>
+            <a:pPr algn="ctr"/>
+            <a:endParaRPr lang="es-ES"/>
+          </a:p>
+        </p:txBody>
+      </p:sp>
+      <p:sp>
+        <p:nvSpPr>
+          <p:cNvPr id="45" name="Rectángulo 44">
+            <a:extLst>
+              <a:ext uri="{FF2B5EF4-FFF2-40B4-BE49-F238E27FC236}">
+                <a16:creationId xmlns:a16="http://schemas.microsoft.com/office/drawing/2014/main" id="{219D33C0-8D5E-6F67-24FB-BD4B4F6BCF37}"/>
+              </a:ext>
+            </a:extLst>
+          </p:cNvPr>
+          <p:cNvSpPr/>
+          <p:nvPr/>
+        </p:nvSpPr>
+        <p:spPr>
+          <a:xfrm>
+            <a:off x="7059917" y="2615753"/>
+            <a:ext cx="4634506" cy="1524421"/>
+          </a:xfrm>
+          <a:prstGeom prst="rect">
+            <a:avLst/>
+          </a:prstGeom>
+          <a:solidFill>
+            <a:srgbClr val="ECF5E7">
+              <a:alpha val="70000"/>
+            </a:srgbClr>
+          </a:solidFill>
+          <a:ln>
+            <a:noFill/>
+          </a:ln>
+        </p:spPr>
+        <p:style>
+          <a:lnRef idx="2">
+            <a:schemeClr val="accent1">
+              <a:shade val="15000"/>
+            </a:schemeClr>
+          </a:lnRef>
+          <a:fillRef idx="1">
+            <a:schemeClr val="accent1"/>
+          </a:fillRef>
+          <a:effectRef idx="0">
+            <a:schemeClr val="accent1"/>
+          </a:effectRef>
+          <a:fontRef idx="minor">
+            <a:schemeClr val="lt1"/>
+          </a:fontRef>
+        </p:style>
+        <p:txBody>
+          <a:bodyPr rtlCol="0" anchor="ctr"/>
+          <a:lstStyle/>
+          <a:p>
+            <a:pPr algn="ctr"/>
+            <a:endParaRPr lang="es-ES"/>
+          </a:p>
+        </p:txBody>
+      </p:sp>
+      <p:sp>
+        <p:nvSpPr>
+          <p:cNvPr id="44" name="Rectángulo 43">
+            <a:extLst>
+              <a:ext uri="{FF2B5EF4-FFF2-40B4-BE49-F238E27FC236}">
+                <a16:creationId xmlns:a16="http://schemas.microsoft.com/office/drawing/2014/main" id="{C0E2984C-D213-9278-C029-D0505BA17E60}"/>
+              </a:ext>
+            </a:extLst>
+          </p:cNvPr>
+          <p:cNvSpPr/>
+          <p:nvPr/>
+        </p:nvSpPr>
+        <p:spPr>
+          <a:xfrm>
+            <a:off x="1432186" y="2671199"/>
+            <a:ext cx="4668451" cy="1524421"/>
+          </a:xfrm>
+          <a:prstGeom prst="rect">
+            <a:avLst/>
+          </a:prstGeom>
+          <a:solidFill>
+            <a:srgbClr val="ECF5E7">
+              <a:alpha val="70000"/>
+            </a:srgbClr>
+          </a:solidFill>
+          <a:ln>
+            <a:noFill/>
+          </a:ln>
+        </p:spPr>
+        <p:style>
+          <a:lnRef idx="2">
+            <a:schemeClr val="accent1">
+              <a:shade val="15000"/>
+            </a:schemeClr>
+          </a:lnRef>
+          <a:fillRef idx="1">
+            <a:schemeClr val="accent1"/>
+          </a:fillRef>
+          <a:effectRef idx="0">
+            <a:schemeClr val="accent1"/>
+          </a:effectRef>
+          <a:fontRef idx="minor">
+            <a:schemeClr val="lt1"/>
+          </a:fontRef>
+        </p:style>
+        <p:txBody>
+          <a:bodyPr rtlCol="0" anchor="ctr"/>
+          <a:lstStyle/>
+          <a:p>
+            <a:pPr algn="ctr"/>
             <a:endParaRPr lang="es-ES" dirty="0"/>
+          </a:p>
+        </p:txBody>
+      </p:sp>
+      <p:sp>
+        <p:nvSpPr>
+          <p:cNvPr id="43" name="Rectángulo 42">
+            <a:extLst>
+              <a:ext uri="{FF2B5EF4-FFF2-40B4-BE49-F238E27FC236}">
+                <a16:creationId xmlns:a16="http://schemas.microsoft.com/office/drawing/2014/main" id="{58F4C01C-A369-0BCA-72A6-E79514BB5A5B}"/>
+              </a:ext>
+            </a:extLst>
+          </p:cNvPr>
+          <p:cNvSpPr/>
+          <p:nvPr/>
+        </p:nvSpPr>
+        <p:spPr>
+          <a:xfrm>
+            <a:off x="1409382" y="800246"/>
+            <a:ext cx="10237507" cy="1067124"/>
+          </a:xfrm>
+          <a:prstGeom prst="rect">
+            <a:avLst/>
+          </a:prstGeom>
+          <a:solidFill>
+            <a:schemeClr val="accent5">
+              <a:lumMod val="20000"/>
+              <a:lumOff val="80000"/>
+              <a:alpha val="42000"/>
+            </a:schemeClr>
+          </a:solidFill>
+          <a:ln>
+            <a:noFill/>
+          </a:ln>
+          <a:effectLst/>
+        </p:spPr>
+        <p:style>
+          <a:lnRef idx="2">
+            <a:schemeClr val="accent1">
+              <a:shade val="15000"/>
+            </a:schemeClr>
+          </a:lnRef>
+          <a:fillRef idx="1">
+            <a:schemeClr val="accent1"/>
+          </a:fillRef>
+          <a:effectRef idx="0">
+            <a:schemeClr val="accent1"/>
+          </a:effectRef>
+          <a:fontRef idx="minor">
+            <a:schemeClr val="lt1"/>
+          </a:fontRef>
+        </p:style>
+        <p:txBody>
+          <a:bodyPr rtlCol="0" anchor="ctr"/>
+          <a:lstStyle/>
+          <a:p>
+            <a:pPr algn="ctr"/>
+            <a:endParaRPr lang="es-ES"/>
           </a:p>
         </p:txBody>
       </p:sp>
       <p:pic>
         <p:nvPicPr>
-          <p:cNvPr id="4" name="Imagen 3">
-            <a:extLst>
-              <a:ext uri="{FF2B5EF4-FFF2-40B4-BE49-F238E27FC236}">
-                <a16:creationId xmlns:a16="http://schemas.microsoft.com/office/drawing/2014/main" id="{E0B6B5F2-6835-F442-058E-A92B5F066948}"/>
+          <p:cNvPr id="22" name="Imagen 21">
+            <a:extLst>
+              <a:ext uri="{FF2B5EF4-FFF2-40B4-BE49-F238E27FC236}">
+                <a16:creationId xmlns:a16="http://schemas.microsoft.com/office/drawing/2014/main" id="{BEDEEC59-4731-4799-8457-9855AC6F8D4D}"/>
               </a:ext>
             </a:extLst>
           </p:cNvPr>
@@ -7794,18 +6905,1013 @@
         </p:blipFill>
         <p:spPr>
           <a:xfrm>
-            <a:off x="696000" y="914400"/>
-            <a:ext cx="10654748" cy="5943600"/>
+            <a:off x="4028819" y="5151398"/>
+            <a:ext cx="1918646" cy="1000431"/>
           </a:xfrm>
           <a:prstGeom prst="rect">
             <a:avLst/>
           </a:prstGeom>
         </p:spPr>
       </p:pic>
+      <p:sp>
+        <p:nvSpPr>
+          <p:cNvPr id="16" name="CuadroTexto 15">
+            <a:extLst>
+              <a:ext uri="{FF2B5EF4-FFF2-40B4-BE49-F238E27FC236}">
+                <a16:creationId xmlns:a16="http://schemas.microsoft.com/office/drawing/2014/main" id="{7A532ED5-B280-9D2D-5C89-824A9A6A9527}"/>
+              </a:ext>
+            </a:extLst>
+          </p:cNvPr>
+          <p:cNvSpPr txBox="1"/>
+          <p:nvPr/>
+        </p:nvSpPr>
+        <p:spPr>
+          <a:xfrm>
+            <a:off x="4223911" y="6177252"/>
+            <a:ext cx="1517788" cy="307777"/>
+          </a:xfrm>
+          <a:prstGeom prst="rect">
+            <a:avLst/>
+          </a:prstGeom>
+          <a:noFill/>
+        </p:spPr>
+        <p:txBody>
+          <a:bodyPr wrap="square" rtlCol="0">
+            <a:spAutoFit/>
+          </a:bodyPr>
+          <a:lstStyle/>
+          <a:p>
+            <a:r>
+              <a:rPr lang="es-VE" sz="1400" dirty="0"/>
+              <a:t>Machine </a:t>
+            </a:r>
+            <a:r>
+              <a:rPr lang="es-VE" sz="1400" dirty="0" err="1"/>
+              <a:t>Learning</a:t>
+            </a:r>
+            <a:endParaRPr lang="es-ES" sz="1400" dirty="0"/>
+          </a:p>
+        </p:txBody>
+      </p:sp>
+      <p:pic>
+        <p:nvPicPr>
+          <p:cNvPr id="17" name="Imagen 16" descr="Logotipo, Icono&#10;&#10;Descripción generada automáticamente">
+            <a:extLst>
+              <a:ext uri="{FF2B5EF4-FFF2-40B4-BE49-F238E27FC236}">
+                <a16:creationId xmlns:a16="http://schemas.microsoft.com/office/drawing/2014/main" id="{C41AB976-8B35-17A3-DA91-D13506E46A37}"/>
+              </a:ext>
+            </a:extLst>
+          </p:cNvPr>
+          <p:cNvPicPr>
+            <a:picLocks noChangeAspect="1"/>
+          </p:cNvPicPr>
+          <p:nvPr/>
+        </p:nvPicPr>
+        <p:blipFill>
+          <a:blip r:embed="rId3">
+            <a:extLst>
+              <a:ext uri="{28A0092B-C50C-407E-A947-70E740481C1C}">
+                <a14:useLocalDpi xmlns:a14="http://schemas.microsoft.com/office/drawing/2010/main" val="0"/>
+              </a:ext>
+            </a:extLst>
+          </a:blip>
+          <a:stretch>
+            <a:fillRect/>
+          </a:stretch>
+        </p:blipFill>
+        <p:spPr>
+          <a:xfrm>
+            <a:off x="8674368" y="3076653"/>
+            <a:ext cx="683406" cy="688444"/>
+          </a:xfrm>
+          <a:prstGeom prst="rect">
+            <a:avLst/>
+          </a:prstGeom>
+        </p:spPr>
+      </p:pic>
+      <p:pic>
+        <p:nvPicPr>
+          <p:cNvPr id="19" name="Imagen 18">
+            <a:extLst>
+              <a:ext uri="{FF2B5EF4-FFF2-40B4-BE49-F238E27FC236}">
+                <a16:creationId xmlns:a16="http://schemas.microsoft.com/office/drawing/2014/main" id="{12125006-0A5F-03B0-E08B-CD9885B459A9}"/>
+              </a:ext>
+            </a:extLst>
+          </p:cNvPr>
+          <p:cNvPicPr>
+            <a:picLocks noChangeAspect="1"/>
+          </p:cNvPicPr>
+          <p:nvPr/>
+        </p:nvPicPr>
+        <p:blipFill>
+          <a:blip r:embed="rId4"/>
+          <a:stretch>
+            <a:fillRect/>
+          </a:stretch>
+        </p:blipFill>
+        <p:spPr>
+          <a:xfrm>
+            <a:off x="7417112" y="5316553"/>
+            <a:ext cx="1053019" cy="748787"/>
+          </a:xfrm>
+          <a:prstGeom prst="rect">
+            <a:avLst/>
+          </a:prstGeom>
+        </p:spPr>
+      </p:pic>
+      <p:pic>
+        <p:nvPicPr>
+          <p:cNvPr id="20" name="Imagen 19">
+            <a:extLst>
+              <a:ext uri="{FF2B5EF4-FFF2-40B4-BE49-F238E27FC236}">
+                <a16:creationId xmlns:a16="http://schemas.microsoft.com/office/drawing/2014/main" id="{BF732DA8-553B-BC48-080F-9FA76ACAC0A4}"/>
+              </a:ext>
+            </a:extLst>
+          </p:cNvPr>
+          <p:cNvPicPr>
+            <a:picLocks noChangeAspect="1"/>
+          </p:cNvPicPr>
+          <p:nvPr/>
+        </p:nvPicPr>
+        <p:blipFill>
+          <a:blip r:embed="rId5"/>
+          <a:stretch>
+            <a:fillRect/>
+          </a:stretch>
+        </p:blipFill>
+        <p:spPr>
+          <a:xfrm>
+            <a:off x="10482261" y="5278923"/>
+            <a:ext cx="679919" cy="688444"/>
+          </a:xfrm>
+          <a:prstGeom prst="rect">
+            <a:avLst/>
+          </a:prstGeom>
+        </p:spPr>
+      </p:pic>
+      <p:pic>
+        <p:nvPicPr>
+          <p:cNvPr id="23" name="Imagen 22">
+            <a:extLst>
+              <a:ext uri="{FF2B5EF4-FFF2-40B4-BE49-F238E27FC236}">
+                <a16:creationId xmlns:a16="http://schemas.microsoft.com/office/drawing/2014/main" id="{4AC9E127-121D-1A09-4242-E83C08370BF2}"/>
+              </a:ext>
+            </a:extLst>
+          </p:cNvPr>
+          <p:cNvPicPr>
+            <a:picLocks noChangeAspect="1"/>
+          </p:cNvPicPr>
+          <p:nvPr/>
+        </p:nvPicPr>
+        <p:blipFill>
+          <a:blip r:embed="rId6"/>
+          <a:stretch>
+            <a:fillRect/>
+          </a:stretch>
+        </p:blipFill>
+        <p:spPr>
+          <a:xfrm>
+            <a:off x="8945798" y="5256143"/>
+            <a:ext cx="799135" cy="809197"/>
+          </a:xfrm>
+          <a:prstGeom prst="rect">
+            <a:avLst/>
+          </a:prstGeom>
+        </p:spPr>
+      </p:pic>
+      <p:pic>
+        <p:nvPicPr>
+          <p:cNvPr id="24" name="Imagen 23">
+            <a:extLst>
+              <a:ext uri="{FF2B5EF4-FFF2-40B4-BE49-F238E27FC236}">
+                <a16:creationId xmlns:a16="http://schemas.microsoft.com/office/drawing/2014/main" id="{0D1B2C75-FA3D-1A44-9C54-029C9A9BC0ED}"/>
+              </a:ext>
+            </a:extLst>
+          </p:cNvPr>
+          <p:cNvPicPr>
+            <a:picLocks noChangeAspect="1"/>
+          </p:cNvPicPr>
+          <p:nvPr/>
+        </p:nvPicPr>
+        <p:blipFill>
+          <a:blip r:embed="rId7"/>
+          <a:stretch>
+            <a:fillRect/>
+          </a:stretch>
+        </p:blipFill>
+        <p:spPr>
+          <a:xfrm>
+            <a:off x="7284152" y="3101595"/>
+            <a:ext cx="1053019" cy="603829"/>
+          </a:xfrm>
+          <a:prstGeom prst="rect">
+            <a:avLst/>
+          </a:prstGeom>
+        </p:spPr>
+      </p:pic>
+      <p:pic>
+        <p:nvPicPr>
+          <p:cNvPr id="31" name="Imagen 30">
+            <a:extLst>
+              <a:ext uri="{FF2B5EF4-FFF2-40B4-BE49-F238E27FC236}">
+                <a16:creationId xmlns:a16="http://schemas.microsoft.com/office/drawing/2014/main" id="{CEA2CAEB-29B1-3B48-A82D-157D9DCDBD8F}"/>
+              </a:ext>
+            </a:extLst>
+          </p:cNvPr>
+          <p:cNvPicPr>
+            <a:picLocks noChangeAspect="1"/>
+          </p:cNvPicPr>
+          <p:nvPr/>
+        </p:nvPicPr>
+        <p:blipFill>
+          <a:blip r:embed="rId8"/>
+          <a:stretch>
+            <a:fillRect/>
+          </a:stretch>
+        </p:blipFill>
+        <p:spPr>
+          <a:xfrm>
+            <a:off x="1753647" y="5151398"/>
+            <a:ext cx="1519179" cy="862185"/>
+          </a:xfrm>
+          <a:prstGeom prst="rect">
+            <a:avLst/>
+          </a:prstGeom>
+        </p:spPr>
+      </p:pic>
+      <p:pic>
+        <p:nvPicPr>
+          <p:cNvPr id="5" name="Imagen 4" descr="Icono&#10;&#10;Descripción generada automáticamente">
+            <a:extLst>
+              <a:ext uri="{FF2B5EF4-FFF2-40B4-BE49-F238E27FC236}">
+                <a16:creationId xmlns:a16="http://schemas.microsoft.com/office/drawing/2014/main" id="{743DA302-01CD-DAF4-C6AC-73A93B30B266}"/>
+              </a:ext>
+            </a:extLst>
+          </p:cNvPr>
+          <p:cNvPicPr>
+            <a:picLocks noChangeAspect="1"/>
+          </p:cNvPicPr>
+          <p:nvPr/>
+        </p:nvPicPr>
+        <p:blipFill>
+          <a:blip r:embed="rId9">
+            <a:extLst>
+              <a:ext uri="{28A0092B-C50C-407E-A947-70E740481C1C}">
+                <a14:useLocalDpi xmlns:a14="http://schemas.microsoft.com/office/drawing/2010/main" val="0"/>
+              </a:ext>
+            </a:extLst>
+          </a:blip>
+          <a:stretch>
+            <a:fillRect/>
+          </a:stretch>
+        </p:blipFill>
+        <p:spPr>
+          <a:xfrm>
+            <a:off x="1782925" y="3101595"/>
+            <a:ext cx="1160878" cy="730897"/>
+          </a:xfrm>
+          <a:prstGeom prst="rect">
+            <a:avLst/>
+          </a:prstGeom>
+        </p:spPr>
+      </p:pic>
+      <p:pic>
+        <p:nvPicPr>
+          <p:cNvPr id="10" name="Imagen 9" descr="Imagen que contiene Diagrama&#10;&#10;Descripción generada automáticamente">
+            <a:extLst>
+              <a:ext uri="{FF2B5EF4-FFF2-40B4-BE49-F238E27FC236}">
+                <a16:creationId xmlns:a16="http://schemas.microsoft.com/office/drawing/2014/main" id="{0DB09EC2-55C0-AAC1-430F-9D1871943AE0}"/>
+              </a:ext>
+            </a:extLst>
+          </p:cNvPr>
+          <p:cNvPicPr>
+            <a:picLocks noChangeAspect="1"/>
+          </p:cNvPicPr>
+          <p:nvPr/>
+        </p:nvPicPr>
+        <p:blipFill>
+          <a:blip r:embed="rId10">
+            <a:extLst>
+              <a:ext uri="{28A0092B-C50C-407E-A947-70E740481C1C}">
+                <a14:useLocalDpi xmlns:a14="http://schemas.microsoft.com/office/drawing/2010/main" val="0"/>
+              </a:ext>
+            </a:extLst>
+          </a:blip>
+          <a:stretch>
+            <a:fillRect/>
+          </a:stretch>
+        </p:blipFill>
+        <p:spPr>
+          <a:xfrm>
+            <a:off x="4500664" y="3016004"/>
+            <a:ext cx="795942" cy="935446"/>
+          </a:xfrm>
+          <a:prstGeom prst="rect">
+            <a:avLst/>
+          </a:prstGeom>
+        </p:spPr>
+      </p:pic>
+      <p:sp>
+        <p:nvSpPr>
+          <p:cNvPr id="12" name="CuadroTexto 11">
+            <a:extLst>
+              <a:ext uri="{FF2B5EF4-FFF2-40B4-BE49-F238E27FC236}">
+                <a16:creationId xmlns:a16="http://schemas.microsoft.com/office/drawing/2014/main" id="{C1F36753-112A-5C75-2A7F-335DB726A84B}"/>
+              </a:ext>
+            </a:extLst>
+          </p:cNvPr>
+          <p:cNvSpPr txBox="1"/>
+          <p:nvPr/>
+        </p:nvSpPr>
+        <p:spPr>
+          <a:xfrm>
+            <a:off x="2227312" y="2671199"/>
+            <a:ext cx="3152225" cy="369332"/>
+          </a:xfrm>
+          <a:prstGeom prst="rect">
+            <a:avLst/>
+          </a:prstGeom>
+          <a:noFill/>
+          <a:ln>
+            <a:solidFill>
+              <a:schemeClr val="bg1"/>
+            </a:solidFill>
+          </a:ln>
+        </p:spPr>
+        <p:txBody>
+          <a:bodyPr wrap="square" rtlCol="0">
+            <a:spAutoFit/>
+          </a:bodyPr>
+          <a:lstStyle/>
+          <a:p>
+            <a:r>
+              <a:rPr lang="es-VE" dirty="0"/>
+              <a:t>Comprensión del Problema</a:t>
+            </a:r>
+            <a:endParaRPr lang="es-ES" dirty="0"/>
+          </a:p>
+        </p:txBody>
+      </p:sp>
+      <p:sp>
+        <p:nvSpPr>
+          <p:cNvPr id="13" name="CuadroTexto 12">
+            <a:extLst>
+              <a:ext uri="{FF2B5EF4-FFF2-40B4-BE49-F238E27FC236}">
+                <a16:creationId xmlns:a16="http://schemas.microsoft.com/office/drawing/2014/main" id="{E57F7C19-71FE-E6C8-1B04-7C6EC2520B62}"/>
+              </a:ext>
+            </a:extLst>
+          </p:cNvPr>
+          <p:cNvSpPr txBox="1"/>
+          <p:nvPr/>
+        </p:nvSpPr>
+        <p:spPr>
+          <a:xfrm>
+            <a:off x="7914373" y="2591863"/>
+            <a:ext cx="2663004" cy="369332"/>
+          </a:xfrm>
+          <a:prstGeom prst="rect">
+            <a:avLst/>
+          </a:prstGeom>
+          <a:noFill/>
+        </p:spPr>
+        <p:txBody>
+          <a:bodyPr wrap="square" rtlCol="0">
+            <a:spAutoFit/>
+          </a:bodyPr>
+          <a:lstStyle/>
+          <a:p>
+            <a:r>
+              <a:rPr lang="es-VE" dirty="0"/>
+              <a:t>Comprensión de los datos</a:t>
+            </a:r>
+            <a:endParaRPr lang="es-ES" dirty="0"/>
+          </a:p>
+        </p:txBody>
+      </p:sp>
+      <p:sp>
+        <p:nvSpPr>
+          <p:cNvPr id="14" name="CuadroTexto 13">
+            <a:extLst>
+              <a:ext uri="{FF2B5EF4-FFF2-40B4-BE49-F238E27FC236}">
+                <a16:creationId xmlns:a16="http://schemas.microsoft.com/office/drawing/2014/main" id="{36777DC1-8DC6-1417-543C-2C29687C263A}"/>
+              </a:ext>
+            </a:extLst>
+          </p:cNvPr>
+          <p:cNvSpPr txBox="1"/>
+          <p:nvPr/>
+        </p:nvSpPr>
+        <p:spPr>
+          <a:xfrm>
+            <a:off x="8053787" y="4859466"/>
+            <a:ext cx="2577440" cy="332968"/>
+          </a:xfrm>
+          <a:prstGeom prst="rect">
+            <a:avLst/>
+          </a:prstGeom>
+          <a:noFill/>
+        </p:spPr>
+        <p:txBody>
+          <a:bodyPr wrap="square" rtlCol="0">
+            <a:spAutoFit/>
+          </a:bodyPr>
+          <a:lstStyle/>
+          <a:p>
+            <a:r>
+              <a:rPr lang="es-VE" dirty="0"/>
+              <a:t>Preparación de los datos</a:t>
+            </a:r>
+            <a:endParaRPr lang="es-ES" dirty="0"/>
+          </a:p>
+        </p:txBody>
+      </p:sp>
+      <p:sp>
+        <p:nvSpPr>
+          <p:cNvPr id="27" name="Flecha: a la derecha 26">
+            <a:extLst>
+              <a:ext uri="{FF2B5EF4-FFF2-40B4-BE49-F238E27FC236}">
+                <a16:creationId xmlns:a16="http://schemas.microsoft.com/office/drawing/2014/main" id="{E6E9DDB4-D82E-3873-26AF-2A12A32380A1}"/>
+              </a:ext>
+            </a:extLst>
+          </p:cNvPr>
+          <p:cNvSpPr/>
+          <p:nvPr/>
+        </p:nvSpPr>
+        <p:spPr>
+          <a:xfrm>
+            <a:off x="6143519" y="3278782"/>
+            <a:ext cx="930028" cy="519893"/>
+          </a:xfrm>
+          <a:prstGeom prst="rightArrow">
+            <a:avLst/>
+          </a:prstGeom>
+        </p:spPr>
+        <p:style>
+          <a:lnRef idx="2">
+            <a:schemeClr val="accent1">
+              <a:shade val="15000"/>
+            </a:schemeClr>
+          </a:lnRef>
+          <a:fillRef idx="1">
+            <a:schemeClr val="accent1"/>
+          </a:fillRef>
+          <a:effectRef idx="0">
+            <a:schemeClr val="accent1"/>
+          </a:effectRef>
+          <a:fontRef idx="minor">
+            <a:schemeClr val="lt1"/>
+          </a:fontRef>
+        </p:style>
+        <p:txBody>
+          <a:bodyPr rtlCol="0" anchor="ctr"/>
+          <a:lstStyle/>
+          <a:p>
+            <a:pPr algn="ctr"/>
+            <a:endParaRPr lang="es-ES"/>
+          </a:p>
+        </p:txBody>
+      </p:sp>
+      <p:sp>
+        <p:nvSpPr>
+          <p:cNvPr id="35" name="Flecha: a la derecha 34">
+            <a:extLst>
+              <a:ext uri="{FF2B5EF4-FFF2-40B4-BE49-F238E27FC236}">
+                <a16:creationId xmlns:a16="http://schemas.microsoft.com/office/drawing/2014/main" id="{3A77BEE8-E194-2010-B7C4-2681488AA4B7}"/>
+              </a:ext>
+            </a:extLst>
+          </p:cNvPr>
+          <p:cNvSpPr/>
+          <p:nvPr/>
+        </p:nvSpPr>
+        <p:spPr>
+          <a:xfrm rot="10800000">
+            <a:off x="6131618" y="5040563"/>
+            <a:ext cx="850632" cy="519893"/>
+          </a:xfrm>
+          <a:prstGeom prst="rightArrow">
+            <a:avLst/>
+          </a:prstGeom>
+        </p:spPr>
+        <p:style>
+          <a:lnRef idx="2">
+            <a:schemeClr val="accent1">
+              <a:shade val="15000"/>
+            </a:schemeClr>
+          </a:lnRef>
+          <a:fillRef idx="1">
+            <a:schemeClr val="accent1"/>
+          </a:fillRef>
+          <a:effectRef idx="0">
+            <a:schemeClr val="accent1"/>
+          </a:effectRef>
+          <a:fontRef idx="minor">
+            <a:schemeClr val="lt1"/>
+          </a:fontRef>
+        </p:style>
+        <p:txBody>
+          <a:bodyPr rtlCol="0" anchor="ctr"/>
+          <a:lstStyle/>
+          <a:p>
+            <a:pPr algn="ctr"/>
+            <a:endParaRPr lang="es-ES"/>
+          </a:p>
+        </p:txBody>
+      </p:sp>
+      <p:sp>
+        <p:nvSpPr>
+          <p:cNvPr id="36" name="Flecha: a la derecha 35">
+            <a:extLst>
+              <a:ext uri="{FF2B5EF4-FFF2-40B4-BE49-F238E27FC236}">
+                <a16:creationId xmlns:a16="http://schemas.microsoft.com/office/drawing/2014/main" id="{95F638AF-CC0E-7459-76E3-A60063C182C6}"/>
+              </a:ext>
+            </a:extLst>
+          </p:cNvPr>
+          <p:cNvSpPr/>
+          <p:nvPr/>
+        </p:nvSpPr>
+        <p:spPr>
+          <a:xfrm rot="5400000">
+            <a:off x="8982324" y="4301229"/>
+            <a:ext cx="707863" cy="519893"/>
+          </a:xfrm>
+          <a:prstGeom prst="rightArrow">
+            <a:avLst/>
+          </a:prstGeom>
+        </p:spPr>
+        <p:style>
+          <a:lnRef idx="2">
+            <a:schemeClr val="accent1">
+              <a:shade val="15000"/>
+            </a:schemeClr>
+          </a:lnRef>
+          <a:fillRef idx="1">
+            <a:schemeClr val="accent1"/>
+          </a:fillRef>
+          <a:effectRef idx="0">
+            <a:schemeClr val="accent1"/>
+          </a:effectRef>
+          <a:fontRef idx="minor">
+            <a:schemeClr val="lt1"/>
+          </a:fontRef>
+        </p:style>
+        <p:txBody>
+          <a:bodyPr rtlCol="0" anchor="ctr"/>
+          <a:lstStyle/>
+          <a:p>
+            <a:pPr algn="ctr"/>
+            <a:endParaRPr lang="es-ES"/>
+          </a:p>
+        </p:txBody>
+      </p:sp>
+      <p:sp>
+        <p:nvSpPr>
+          <p:cNvPr id="33" name="CuadroTexto 32">
+            <a:extLst>
+              <a:ext uri="{FF2B5EF4-FFF2-40B4-BE49-F238E27FC236}">
+                <a16:creationId xmlns:a16="http://schemas.microsoft.com/office/drawing/2014/main" id="{C33319EE-8A35-BDE5-E268-F83D2A81A8E5}"/>
+              </a:ext>
+            </a:extLst>
+          </p:cNvPr>
+          <p:cNvSpPr txBox="1"/>
+          <p:nvPr/>
+        </p:nvSpPr>
+        <p:spPr>
+          <a:xfrm>
+            <a:off x="7560710" y="1564200"/>
+            <a:ext cx="2857292" cy="307777"/>
+          </a:xfrm>
+          <a:prstGeom prst="rect">
+            <a:avLst/>
+          </a:prstGeom>
+          <a:noFill/>
+        </p:spPr>
+        <p:txBody>
+          <a:bodyPr wrap="square" rtlCol="0">
+            <a:spAutoFit/>
+          </a:bodyPr>
+          <a:lstStyle/>
+          <a:p>
+            <a:r>
+              <a:rPr lang="es-VE" sz="1400" dirty="0"/>
+              <a:t>Plataforma de control de versiones</a:t>
+            </a:r>
+            <a:endParaRPr lang="es-ES" sz="1400" dirty="0"/>
+          </a:p>
+        </p:txBody>
+      </p:sp>
+      <p:pic>
+        <p:nvPicPr>
+          <p:cNvPr id="21" name="Imagen 20">
+            <a:extLst>
+              <a:ext uri="{FF2B5EF4-FFF2-40B4-BE49-F238E27FC236}">
+                <a16:creationId xmlns:a16="http://schemas.microsoft.com/office/drawing/2014/main" id="{5D28DEA3-BC70-D71F-A715-73742B25BFF9}"/>
+              </a:ext>
+            </a:extLst>
+          </p:cNvPr>
+          <p:cNvPicPr>
+            <a:picLocks noChangeAspect="1"/>
+          </p:cNvPicPr>
+          <p:nvPr/>
+        </p:nvPicPr>
+        <p:blipFill rotWithShape="1">
+          <a:blip r:embed="rId11">
+            <a:alphaModFix/>
+          </a:blip>
+          <a:srcRect r="9656"/>
+          <a:stretch/>
+        </p:blipFill>
+        <p:spPr>
+          <a:xfrm>
+            <a:off x="3422104" y="836156"/>
+            <a:ext cx="728655" cy="810719"/>
+          </a:xfrm>
+          <a:prstGeom prst="rect">
+            <a:avLst/>
+          </a:prstGeom>
+          <a:noFill/>
+        </p:spPr>
+      </p:pic>
+      <p:pic>
+        <p:nvPicPr>
+          <p:cNvPr id="25" name="Imagen 24">
+            <a:extLst>
+              <a:ext uri="{FF2B5EF4-FFF2-40B4-BE49-F238E27FC236}">
+                <a16:creationId xmlns:a16="http://schemas.microsoft.com/office/drawing/2014/main" id="{9754C956-4315-0D0A-55DC-4E4014AA7145}"/>
+              </a:ext>
+            </a:extLst>
+          </p:cNvPr>
+          <p:cNvPicPr>
+            <a:picLocks noChangeAspect="1"/>
+          </p:cNvPicPr>
+          <p:nvPr/>
+        </p:nvPicPr>
+        <p:blipFill>
+          <a:blip r:embed="rId12"/>
+          <a:stretch>
+            <a:fillRect/>
+          </a:stretch>
+        </p:blipFill>
+        <p:spPr>
+          <a:xfrm>
+            <a:off x="8394270" y="857555"/>
+            <a:ext cx="1076512" cy="607346"/>
+          </a:xfrm>
+          <a:prstGeom prst="rect">
+            <a:avLst/>
+          </a:prstGeom>
+          <a:noFill/>
+        </p:spPr>
+      </p:pic>
+      <p:sp>
+        <p:nvSpPr>
+          <p:cNvPr id="32" name="CuadroTexto 31">
+            <a:extLst>
+              <a:ext uri="{FF2B5EF4-FFF2-40B4-BE49-F238E27FC236}">
+                <a16:creationId xmlns:a16="http://schemas.microsoft.com/office/drawing/2014/main" id="{52054116-1532-8CD3-A089-A447296BD0CC}"/>
+              </a:ext>
+            </a:extLst>
+          </p:cNvPr>
+          <p:cNvSpPr txBox="1"/>
+          <p:nvPr/>
+        </p:nvSpPr>
+        <p:spPr>
+          <a:xfrm>
+            <a:off x="2853488" y="1592961"/>
+            <a:ext cx="2014765" cy="307777"/>
+          </a:xfrm>
+          <a:prstGeom prst="rect">
+            <a:avLst/>
+          </a:prstGeom>
+          <a:noFill/>
+        </p:spPr>
+        <p:txBody>
+          <a:bodyPr wrap="square" rtlCol="0">
+            <a:spAutoFit/>
+          </a:bodyPr>
+          <a:lstStyle/>
+          <a:p>
+            <a:r>
+              <a:rPr lang="es-VE" sz="1400" dirty="0"/>
+              <a:t>Editor de código fuente</a:t>
+            </a:r>
+            <a:endParaRPr lang="es-ES" sz="1400" dirty="0"/>
+          </a:p>
+        </p:txBody>
+      </p:sp>
+      <p:sp>
+        <p:nvSpPr>
+          <p:cNvPr id="39" name="CuadroTexto 38">
+            <a:extLst>
+              <a:ext uri="{FF2B5EF4-FFF2-40B4-BE49-F238E27FC236}">
+                <a16:creationId xmlns:a16="http://schemas.microsoft.com/office/drawing/2014/main" id="{8D8A213B-6128-3905-EC8C-0DF1749088C5}"/>
+              </a:ext>
+            </a:extLst>
+          </p:cNvPr>
+          <p:cNvSpPr txBox="1"/>
+          <p:nvPr/>
+        </p:nvSpPr>
+        <p:spPr>
+          <a:xfrm>
+            <a:off x="5488685" y="426307"/>
+            <a:ext cx="1800000" cy="369332"/>
+          </a:xfrm>
+          <a:prstGeom prst="rect">
+            <a:avLst/>
+          </a:prstGeom>
+          <a:noFill/>
+        </p:spPr>
+        <p:txBody>
+          <a:bodyPr wrap="square" rtlCol="0">
+            <a:spAutoFit/>
+          </a:bodyPr>
+          <a:lstStyle/>
+          <a:p>
+            <a:pPr algn="ctr"/>
+            <a:r>
+              <a:rPr lang="es-VE" b="1" dirty="0"/>
+              <a:t>Herramientas</a:t>
+            </a:r>
+            <a:endParaRPr lang="es-ES" b="1" dirty="0"/>
+          </a:p>
+        </p:txBody>
+      </p:sp>
+      <p:sp>
+        <p:nvSpPr>
+          <p:cNvPr id="3" name="CuadroTexto 2">
+            <a:extLst>
+              <a:ext uri="{FF2B5EF4-FFF2-40B4-BE49-F238E27FC236}">
+                <a16:creationId xmlns:a16="http://schemas.microsoft.com/office/drawing/2014/main" id="{9458BE3E-2561-6CA3-5700-9DF68B4EEA00}"/>
+              </a:ext>
+            </a:extLst>
+          </p:cNvPr>
+          <p:cNvSpPr txBox="1"/>
+          <p:nvPr/>
+        </p:nvSpPr>
+        <p:spPr>
+          <a:xfrm>
+            <a:off x="2151758" y="3904971"/>
+            <a:ext cx="2874954" cy="307777"/>
+          </a:xfrm>
+          <a:prstGeom prst="rect">
+            <a:avLst/>
+          </a:prstGeom>
+          <a:noFill/>
+        </p:spPr>
+        <p:txBody>
+          <a:bodyPr wrap="none" rtlCol="0">
+            <a:spAutoFit/>
+          </a:bodyPr>
+          <a:lstStyle/>
+          <a:p>
+            <a:r>
+              <a:rPr lang="es-VE" sz="1400" dirty="0"/>
+              <a:t>Análisis y Jerarquización de Impactos</a:t>
+            </a:r>
+            <a:endParaRPr lang="es-ES" sz="1400" dirty="0"/>
+          </a:p>
+        </p:txBody>
+      </p:sp>
+      <p:sp>
+        <p:nvSpPr>
+          <p:cNvPr id="6" name="CuadroTexto 5">
+            <a:extLst>
+              <a:ext uri="{FF2B5EF4-FFF2-40B4-BE49-F238E27FC236}">
+                <a16:creationId xmlns:a16="http://schemas.microsoft.com/office/drawing/2014/main" id="{CDBF862F-9240-AE68-37BF-F8B40000109E}"/>
+              </a:ext>
+            </a:extLst>
+          </p:cNvPr>
+          <p:cNvSpPr txBox="1"/>
+          <p:nvPr/>
+        </p:nvSpPr>
+        <p:spPr>
+          <a:xfrm>
+            <a:off x="7914373" y="3824770"/>
+            <a:ext cx="3052947" cy="307777"/>
+          </a:xfrm>
+          <a:prstGeom prst="rect">
+            <a:avLst/>
+          </a:prstGeom>
+          <a:noFill/>
+        </p:spPr>
+        <p:txBody>
+          <a:bodyPr wrap="square" rtlCol="0">
+            <a:spAutoFit/>
+          </a:bodyPr>
+          <a:lstStyle/>
+          <a:p>
+            <a:r>
+              <a:rPr lang="es-VE" sz="1400" dirty="0"/>
+              <a:t>Análisis, visualización y limpieza inicial</a:t>
+            </a:r>
+            <a:endParaRPr lang="es-ES" sz="1400" dirty="0"/>
+          </a:p>
+        </p:txBody>
+      </p:sp>
+      <p:pic>
+        <p:nvPicPr>
+          <p:cNvPr id="8" name="Imagen 7" descr="Fondo negro con letras blancas&#10;&#10;Descripción generada automáticamente con confianza media">
+            <a:extLst>
+              <a:ext uri="{FF2B5EF4-FFF2-40B4-BE49-F238E27FC236}">
+                <a16:creationId xmlns:a16="http://schemas.microsoft.com/office/drawing/2014/main" id="{07559A14-873B-223B-4BCF-F21EC40060DE}"/>
+              </a:ext>
+            </a:extLst>
+          </p:cNvPr>
+          <p:cNvPicPr>
+            <a:picLocks noChangeAspect="1"/>
+          </p:cNvPicPr>
+          <p:nvPr/>
+        </p:nvPicPr>
+        <p:blipFill>
+          <a:blip r:embed="rId13">
+            <a:extLst>
+              <a:ext uri="{28A0092B-C50C-407E-A947-70E740481C1C}">
+                <a14:useLocalDpi xmlns:a14="http://schemas.microsoft.com/office/drawing/2010/main" val="0"/>
+              </a:ext>
+            </a:extLst>
+          </a:blip>
+          <a:stretch>
+            <a:fillRect/>
+          </a:stretch>
+        </p:blipFill>
+        <p:spPr>
+          <a:xfrm>
+            <a:off x="10967320" y="3133042"/>
+            <a:ext cx="516498" cy="523478"/>
+          </a:xfrm>
+          <a:prstGeom prst="rect">
+            <a:avLst/>
+          </a:prstGeom>
+        </p:spPr>
+      </p:pic>
+      <p:pic>
+        <p:nvPicPr>
+          <p:cNvPr id="11" name="Imagen 10" descr="Icono&#10;&#10;Descripción generada automáticamente">
+            <a:extLst>
+              <a:ext uri="{FF2B5EF4-FFF2-40B4-BE49-F238E27FC236}">
+                <a16:creationId xmlns:a16="http://schemas.microsoft.com/office/drawing/2014/main" id="{82780D3A-5A6D-711F-FC7A-80AEC70252DF}"/>
+              </a:ext>
+            </a:extLst>
+          </p:cNvPr>
+          <p:cNvPicPr>
+            <a:picLocks noChangeAspect="1"/>
+          </p:cNvPicPr>
+          <p:nvPr/>
+        </p:nvPicPr>
+        <p:blipFill>
+          <a:blip r:embed="rId14">
+            <a:extLst>
+              <a:ext uri="{28A0092B-C50C-407E-A947-70E740481C1C}">
+                <a14:useLocalDpi xmlns:a14="http://schemas.microsoft.com/office/drawing/2010/main" val="0"/>
+              </a:ext>
+            </a:extLst>
+          </a:blip>
+          <a:stretch>
+            <a:fillRect/>
+          </a:stretch>
+        </p:blipFill>
+        <p:spPr>
+          <a:xfrm>
+            <a:off x="9690229" y="3067778"/>
+            <a:ext cx="748196" cy="748196"/>
+          </a:xfrm>
+          <a:prstGeom prst="rect">
+            <a:avLst/>
+          </a:prstGeom>
+        </p:spPr>
+      </p:pic>
+      <p:sp>
+        <p:nvSpPr>
+          <p:cNvPr id="15" name="CuadroTexto 14">
+            <a:extLst>
+              <a:ext uri="{FF2B5EF4-FFF2-40B4-BE49-F238E27FC236}">
+                <a16:creationId xmlns:a16="http://schemas.microsoft.com/office/drawing/2014/main" id="{4BA62170-B33B-432C-9878-D14F45790500}"/>
+              </a:ext>
+            </a:extLst>
+          </p:cNvPr>
+          <p:cNvSpPr txBox="1"/>
+          <p:nvPr/>
+        </p:nvSpPr>
+        <p:spPr>
+          <a:xfrm>
+            <a:off x="7914373" y="6151829"/>
+            <a:ext cx="3502158" cy="307777"/>
+          </a:xfrm>
+          <a:prstGeom prst="rect">
+            <a:avLst/>
+          </a:prstGeom>
+          <a:noFill/>
+        </p:spPr>
+        <p:txBody>
+          <a:bodyPr wrap="square" rtlCol="0">
+            <a:spAutoFit/>
+          </a:bodyPr>
+          <a:lstStyle/>
+          <a:p>
+            <a:r>
+              <a:rPr lang="es-VE" sz="1400" dirty="0"/>
+              <a:t>Tratamiento de nulos, </a:t>
+            </a:r>
+            <a:r>
+              <a:rPr lang="es-VE" sz="1400" dirty="0" err="1"/>
+              <a:t>outliers</a:t>
+            </a:r>
+            <a:r>
+              <a:rPr lang="es-VE" sz="1400" dirty="0"/>
+              <a:t>, balanceos…</a:t>
+            </a:r>
+            <a:endParaRPr lang="es-ES" sz="1400" dirty="0"/>
+          </a:p>
+        </p:txBody>
+      </p:sp>
+      <p:sp>
+        <p:nvSpPr>
+          <p:cNvPr id="18" name="CuadroTexto 17">
+            <a:extLst>
+              <a:ext uri="{FF2B5EF4-FFF2-40B4-BE49-F238E27FC236}">
+                <a16:creationId xmlns:a16="http://schemas.microsoft.com/office/drawing/2014/main" id="{25FEB2F4-C039-5DBB-34FF-6EE72A821587}"/>
+              </a:ext>
+            </a:extLst>
+          </p:cNvPr>
+          <p:cNvSpPr txBox="1"/>
+          <p:nvPr/>
+        </p:nvSpPr>
+        <p:spPr>
+          <a:xfrm>
+            <a:off x="1595703" y="5972512"/>
+            <a:ext cx="2204446" cy="523220"/>
+          </a:xfrm>
+          <a:prstGeom prst="rect">
+            <a:avLst/>
+          </a:prstGeom>
+          <a:noFill/>
+        </p:spPr>
+        <p:txBody>
+          <a:bodyPr wrap="square" rtlCol="0">
+            <a:spAutoFit/>
+          </a:bodyPr>
+          <a:lstStyle/>
+          <a:p>
+            <a:pPr algn="ctr"/>
+            <a:r>
+              <a:rPr lang="es-VE" sz="1400" dirty="0" err="1"/>
+              <a:t>Dashboard</a:t>
+            </a:r>
+            <a:endParaRPr lang="es-VE" sz="1400" dirty="0"/>
+          </a:p>
+          <a:p>
+            <a:pPr algn="ctr"/>
+            <a:r>
+              <a:rPr lang="es-VE" sz="1400" dirty="0"/>
+              <a:t>Visualizaciones interactivas</a:t>
+            </a:r>
+            <a:endParaRPr lang="es-ES" sz="1400" dirty="0"/>
+          </a:p>
+        </p:txBody>
+      </p:sp>
+      <p:sp>
+        <p:nvSpPr>
+          <p:cNvPr id="34" name="CuadroTexto 33">
+            <a:extLst>
+              <a:ext uri="{FF2B5EF4-FFF2-40B4-BE49-F238E27FC236}">
+                <a16:creationId xmlns:a16="http://schemas.microsoft.com/office/drawing/2014/main" id="{1C588EB2-AB9A-65A6-30F7-55AC8DD85B95}"/>
+              </a:ext>
+            </a:extLst>
+          </p:cNvPr>
+          <p:cNvSpPr txBox="1"/>
+          <p:nvPr/>
+        </p:nvSpPr>
+        <p:spPr>
+          <a:xfrm>
+            <a:off x="3264441" y="4875394"/>
+            <a:ext cx="1199955" cy="369332"/>
+          </a:xfrm>
+          <a:prstGeom prst="rect">
+            <a:avLst/>
+          </a:prstGeom>
+          <a:noFill/>
+          <a:ln>
+            <a:solidFill>
+              <a:schemeClr val="bg1"/>
+            </a:solidFill>
+          </a:ln>
+        </p:spPr>
+        <p:txBody>
+          <a:bodyPr wrap="square" rtlCol="0">
+            <a:spAutoFit/>
+          </a:bodyPr>
+          <a:lstStyle/>
+          <a:p>
+            <a:r>
+              <a:rPr lang="es-VE" dirty="0"/>
+              <a:t>Modelado</a:t>
+            </a:r>
+            <a:endParaRPr lang="es-ES" dirty="0"/>
+          </a:p>
+        </p:txBody>
+      </p:sp>
     </p:spTree>
     <p:extLst>
       <p:ext uri="{BB962C8B-B14F-4D97-AF65-F5344CB8AC3E}">
-        <p14:creationId xmlns:p14="http://schemas.microsoft.com/office/powerpoint/2010/main" val="2444442167"/>
+        <p14:creationId xmlns:p14="http://schemas.microsoft.com/office/powerpoint/2010/main" val="218210802"/>
       </p:ext>
     </p:extLst>
   </p:cSld>
@@ -7862,7 +7968,7 @@
           <a:p>
             <a:r>
               <a:rPr lang="es-VE" dirty="0"/>
-              <a:t>EDA de base de datos de CHINA de Desastres Naturales, pegado como imagen</a:t>
+              <a:t>EDA de base de datos completa de Desastres Naturales, pegado sencillo</a:t>
             </a:r>
             <a:endParaRPr lang="es-ES" dirty="0"/>
           </a:p>
@@ -7870,10 +7976,10 @@
       </p:sp>
       <p:pic>
         <p:nvPicPr>
-          <p:cNvPr id="5" name="Imagen 4">
-            <a:extLst>
-              <a:ext uri="{FF2B5EF4-FFF2-40B4-BE49-F238E27FC236}">
-                <a16:creationId xmlns:a16="http://schemas.microsoft.com/office/drawing/2014/main" id="{87280CF9-DAE9-7C2D-2B36-469DE80827DA}"/>
+          <p:cNvPr id="4" name="Imagen 3">
+            <a:extLst>
+              <a:ext uri="{FF2B5EF4-FFF2-40B4-BE49-F238E27FC236}">
+                <a16:creationId xmlns:a16="http://schemas.microsoft.com/office/drawing/2014/main" id="{E0B6B5F2-6835-F442-058E-A92B5F066948}"/>
               </a:ext>
             </a:extLst>
           </p:cNvPr>
@@ -7890,8 +7996,8 @@
         </p:blipFill>
         <p:spPr>
           <a:xfrm>
-            <a:off x="863539" y="1197534"/>
-            <a:ext cx="10080000" cy="5436405"/>
+            <a:off x="696000" y="914400"/>
+            <a:ext cx="10654748" cy="5943600"/>
           </a:xfrm>
           <a:prstGeom prst="rect">
             <a:avLst/>
@@ -7901,7 +8007,7 @@
     </p:spTree>
     <p:extLst>
       <p:ext uri="{BB962C8B-B14F-4D97-AF65-F5344CB8AC3E}">
-        <p14:creationId xmlns:p14="http://schemas.microsoft.com/office/powerpoint/2010/main" val="4053829698"/>
+        <p14:creationId xmlns:p14="http://schemas.microsoft.com/office/powerpoint/2010/main" val="2444442167"/>
       </p:ext>
     </p:extLst>
   </p:cSld>

</xml_diff>